<commit_message>
a lot: shield, cloak, ...
</commit_message>
<xml_diff>
--- a/Battle IA.pptx
+++ b/Battle IA.pptx
@@ -6,21 +6,23 @@
   </p:sldMasterIdLst>
   <p:sldIdLst>
     <p:sldId id="256" r:id="rId2"/>
-    <p:sldId id="267" r:id="rId3"/>
-    <p:sldId id="269" r:id="rId4"/>
-    <p:sldId id="261" r:id="rId5"/>
-    <p:sldId id="268" r:id="rId6"/>
-    <p:sldId id="257" r:id="rId7"/>
-    <p:sldId id="264" r:id="rId8"/>
-    <p:sldId id="266" r:id="rId9"/>
-    <p:sldId id="258" r:id="rId10"/>
-    <p:sldId id="265" r:id="rId11"/>
-    <p:sldId id="259" r:id="rId12"/>
-    <p:sldId id="260" r:id="rId13"/>
-    <p:sldId id="262" r:id="rId14"/>
-    <p:sldId id="263" r:id="rId15"/>
-    <p:sldId id="270" r:id="rId16"/>
-    <p:sldId id="271" r:id="rId17"/>
+    <p:sldId id="273" r:id="rId3"/>
+    <p:sldId id="267" r:id="rId4"/>
+    <p:sldId id="274" r:id="rId5"/>
+    <p:sldId id="269" r:id="rId6"/>
+    <p:sldId id="261" r:id="rId7"/>
+    <p:sldId id="268" r:id="rId8"/>
+    <p:sldId id="257" r:id="rId9"/>
+    <p:sldId id="264" r:id="rId10"/>
+    <p:sldId id="266" r:id="rId11"/>
+    <p:sldId id="258" r:id="rId12"/>
+    <p:sldId id="265" r:id="rId13"/>
+    <p:sldId id="259" r:id="rId14"/>
+    <p:sldId id="260" r:id="rId15"/>
+    <p:sldId id="262" r:id="rId16"/>
+    <p:sldId id="263" r:id="rId17"/>
+    <p:sldId id="270" r:id="rId18"/>
+    <p:sldId id="271" r:id="rId19"/>
   </p:sldIdLst>
   <p:sldSz cx="12192000" cy="6858000"/>
   <p:notesSz cx="6858000" cy="9144000"/>
@@ -208,7 +210,7 @@
           </a:lstStyle>
           <a:p>
             <a:r>
-              <a:rPr lang="fr-FR" smtClean="0"/>
+              <a:rPr lang="fr-FR"/>
               <a:t>Modifiez le style du titre</a:t>
             </a:r>
             <a:endParaRPr lang="en-US" dirty="0"/>
@@ -327,7 +329,7 @@
           </a:lstStyle>
           <a:p>
             <a:r>
-              <a:rPr lang="fr-FR" smtClean="0"/>
+              <a:rPr lang="fr-FR"/>
               <a:t>Modifier le style des sous-titres du masque</a:t>
             </a:r>
             <a:endParaRPr lang="en-US" dirty="0"/>
@@ -356,7 +358,7 @@
           <a:p>
             <a:fld id="{4C3DC8E8-D6EF-42BD-939F-587419C538B1}" type="datetimeFigureOut">
               <a:rPr lang="fr-FR" smtClean="0"/>
-              <a:t>05/02/2019</a:t>
+              <a:t>16/04/2019</a:t>
             </a:fld>
             <a:endParaRPr lang="fr-FR"/>
           </a:p>
@@ -501,7 +503,7 @@
           </a:lstStyle>
           <a:p>
             <a:r>
-              <a:rPr lang="fr-FR" smtClean="0"/>
+              <a:rPr lang="fr-FR"/>
               <a:t>Modifiez le style du titre</a:t>
             </a:r>
             <a:endParaRPr lang="en-US" dirty="0"/>
@@ -599,7 +601,7 @@
           </a:lstStyle>
           <a:p>
             <a:r>
-              <a:rPr lang="fr-FR" smtClean="0"/>
+              <a:rPr lang="fr-FR"/>
               <a:t>Cliquez sur l'icône pour ajouter une image</a:t>
             </a:r>
             <a:endParaRPr lang="en-US" dirty="0"/>
@@ -667,7 +669,7 @@
           <a:p>
             <a:pPr lvl="0"/>
             <a:r>
-              <a:rPr lang="fr-FR" smtClean="0"/>
+              <a:rPr lang="fr-FR"/>
               <a:t>Modifier les styles du texte du masque</a:t>
             </a:r>
           </a:p>
@@ -690,7 +692,7 @@
           <a:p>
             <a:fld id="{4C3DC8E8-D6EF-42BD-939F-587419C538B1}" type="datetimeFigureOut">
               <a:rPr lang="fr-FR" smtClean="0"/>
-              <a:t>05/02/2019</a:t>
+              <a:t>16/04/2019</a:t>
             </a:fld>
             <a:endParaRPr lang="fr-FR"/>
           </a:p>
@@ -825,7 +827,7 @@
           </a:lstStyle>
           <a:p>
             <a:r>
-              <a:rPr lang="fr-FR" smtClean="0"/>
+              <a:rPr lang="fr-FR"/>
               <a:t>Modifiez le style du titre</a:t>
             </a:r>
             <a:endParaRPr lang="en-US" dirty="0"/>
@@ -945,7 +947,7 @@
           <a:p>
             <a:pPr lvl="0"/>
             <a:r>
-              <a:rPr lang="fr-FR" smtClean="0"/>
+              <a:rPr lang="fr-FR"/>
               <a:t>Modifier les styles du texte du masque</a:t>
             </a:r>
           </a:p>
@@ -968,7 +970,7 @@
           <a:p>
             <a:fld id="{4C3DC8E8-D6EF-42BD-939F-587419C538B1}" type="datetimeFigureOut">
               <a:rPr lang="fr-FR" smtClean="0"/>
-              <a:t>05/02/2019</a:t>
+              <a:t>16/04/2019</a:t>
             </a:fld>
             <a:endParaRPr lang="fr-FR"/>
           </a:p>
@@ -1339,7 +1341,7 @@
           </a:lstStyle>
           <a:p>
             <a:r>
-              <a:rPr lang="fr-FR" smtClean="0"/>
+              <a:rPr lang="fr-FR"/>
               <a:t>Modifiez le style du titre</a:t>
             </a:r>
             <a:endParaRPr lang="en-US" dirty="0"/>
@@ -1394,7 +1396,7 @@
           <a:p>
             <a:pPr lvl="0"/>
             <a:r>
-              <a:rPr lang="fr-FR" smtClean="0"/>
+              <a:rPr lang="fr-FR"/>
               <a:t>Modifier les styles du texte du masque</a:t>
             </a:r>
           </a:p>
@@ -1513,7 +1515,7 @@
           <a:p>
             <a:pPr lvl="0"/>
             <a:r>
-              <a:rPr lang="fr-FR" smtClean="0"/>
+              <a:rPr lang="fr-FR"/>
               <a:t>Modifier les styles du texte du masque</a:t>
             </a:r>
           </a:p>
@@ -1536,7 +1538,7 @@
           <a:p>
             <a:fld id="{4C3DC8E8-D6EF-42BD-939F-587419C538B1}" type="datetimeFigureOut">
               <a:rPr lang="fr-FR" smtClean="0"/>
-              <a:t>05/02/2019</a:t>
+              <a:t>16/04/2019</a:t>
             </a:fld>
             <a:endParaRPr lang="fr-FR"/>
           </a:p>
@@ -1671,7 +1673,7 @@
           </a:lstStyle>
           <a:p>
             <a:r>
-              <a:rPr lang="fr-FR" smtClean="0"/>
+              <a:rPr lang="fr-FR"/>
               <a:t>Modifiez le style du titre</a:t>
             </a:r>
             <a:endParaRPr lang="en-US" dirty="0"/>
@@ -1791,7 +1793,7 @@
           <a:p>
             <a:pPr lvl="0"/>
             <a:r>
-              <a:rPr lang="fr-FR" smtClean="0"/>
+              <a:rPr lang="fr-FR"/>
               <a:t>Modifier les styles du texte du masque</a:t>
             </a:r>
           </a:p>
@@ -1814,7 +1816,7 @@
           <a:p>
             <a:fld id="{4C3DC8E8-D6EF-42BD-939F-587419C538B1}" type="datetimeFigureOut">
               <a:rPr lang="fr-FR" smtClean="0"/>
-              <a:t>05/02/2019</a:t>
+              <a:t>16/04/2019</a:t>
             </a:fld>
             <a:endParaRPr lang="fr-FR"/>
           </a:p>
@@ -2185,7 +2187,7 @@
           </a:lstStyle>
           <a:p>
             <a:r>
-              <a:rPr lang="fr-FR" smtClean="0"/>
+              <a:rPr lang="fr-FR"/>
               <a:t>Modifiez le style du titre</a:t>
             </a:r>
             <a:endParaRPr lang="en-US" dirty="0"/>
@@ -2234,7 +2236,7 @@
               <a:buNone/>
             </a:pPr>
             <a:r>
-              <a:rPr lang="fr-FR" smtClean="0"/>
+              <a:rPr lang="fr-FR"/>
               <a:t>Modifier les styles du texte du masque</a:t>
             </a:r>
           </a:p>
@@ -2353,7 +2355,7 @@
           <a:p>
             <a:pPr lvl="0"/>
             <a:r>
-              <a:rPr lang="fr-FR" smtClean="0"/>
+              <a:rPr lang="fr-FR"/>
               <a:t>Modifier les styles du texte du masque</a:t>
             </a:r>
           </a:p>
@@ -2376,7 +2378,7 @@
           <a:p>
             <a:fld id="{4C3DC8E8-D6EF-42BD-939F-587419C538B1}" type="datetimeFigureOut">
               <a:rPr lang="fr-FR" smtClean="0"/>
-              <a:t>05/02/2019</a:t>
+              <a:t>16/04/2019</a:t>
             </a:fld>
             <a:endParaRPr lang="fr-FR"/>
           </a:p>
@@ -2512,7 +2514,7 @@
           <a:p>
             <a:pPr marL="0" lvl="0"/>
             <a:r>
-              <a:rPr lang="fr-FR" smtClean="0"/>
+              <a:rPr lang="fr-FR"/>
               <a:t>Modifiez le style du titre</a:t>
             </a:r>
             <a:endParaRPr lang="en-US" dirty="0"/>
@@ -2561,7 +2563,7 @@
               <a:buNone/>
             </a:pPr>
             <a:r>
-              <a:rPr lang="fr-FR" smtClean="0"/>
+              <a:rPr lang="fr-FR"/>
               <a:t>Modifier les styles du texte du masque</a:t>
             </a:r>
           </a:p>
@@ -2680,7 +2682,7 @@
           <a:p>
             <a:pPr lvl="0"/>
             <a:r>
-              <a:rPr lang="fr-FR" smtClean="0"/>
+              <a:rPr lang="fr-FR"/>
               <a:t>Modifier les styles du texte du masque</a:t>
             </a:r>
           </a:p>
@@ -2703,7 +2705,7 @@
           <a:p>
             <a:fld id="{4C3DC8E8-D6EF-42BD-939F-587419C538B1}" type="datetimeFigureOut">
               <a:rPr lang="fr-FR" smtClean="0"/>
-              <a:t>05/02/2019</a:t>
+              <a:t>16/04/2019</a:t>
             </a:fld>
             <a:endParaRPr lang="fr-FR"/>
           </a:p>
@@ -2828,35 +2830,35 @@
           <a:p>
             <a:pPr lvl="0"/>
             <a:r>
-              <a:rPr lang="fr-FR" smtClean="0"/>
+              <a:rPr lang="fr-FR"/>
               <a:t>Modifier les styles du texte du masque</a:t>
             </a:r>
           </a:p>
           <a:p>
             <a:pPr lvl="1"/>
             <a:r>
-              <a:rPr lang="fr-FR" smtClean="0"/>
+              <a:rPr lang="fr-FR"/>
               <a:t>Deuxième niveau</a:t>
             </a:r>
           </a:p>
           <a:p>
             <a:pPr lvl="2"/>
             <a:r>
-              <a:rPr lang="fr-FR" smtClean="0"/>
+              <a:rPr lang="fr-FR"/>
               <a:t>Troisième niveau</a:t>
             </a:r>
           </a:p>
           <a:p>
             <a:pPr lvl="3"/>
             <a:r>
-              <a:rPr lang="fr-FR" smtClean="0"/>
+              <a:rPr lang="fr-FR"/>
               <a:t>Quatrième niveau</a:t>
             </a:r>
           </a:p>
           <a:p>
             <a:pPr lvl="4"/>
             <a:r>
-              <a:rPr lang="fr-FR" smtClean="0"/>
+              <a:rPr lang="fr-FR"/>
               <a:t>Cinquième niveau</a:t>
             </a:r>
             <a:endParaRPr lang="en-US" dirty="0"/>
@@ -2880,7 +2882,7 @@
           <a:p>
             <a:fld id="{4C3DC8E8-D6EF-42BD-939F-587419C538B1}" type="datetimeFigureOut">
               <a:rPr lang="fr-FR" smtClean="0"/>
-              <a:t>05/02/2019</a:t>
+              <a:t>16/04/2019</a:t>
             </a:fld>
             <a:endParaRPr lang="fr-FR"/>
           </a:p>
@@ -2949,7 +2951,7 @@
           <a:lstStyle/>
           <a:p>
             <a:r>
-              <a:rPr lang="fr-FR" smtClean="0"/>
+              <a:rPr lang="fr-FR"/>
               <a:t>Modifiez le style du titre</a:t>
             </a:r>
             <a:endParaRPr lang="en-US" dirty="0"/>
@@ -3037,7 +3039,7 @@
           <a:lstStyle/>
           <a:p>
             <a:r>
-              <a:rPr lang="fr-FR" smtClean="0"/>
+              <a:rPr lang="fr-FR"/>
               <a:t>Modifiez le style du titre</a:t>
             </a:r>
             <a:endParaRPr lang="en-US" dirty="0"/>
@@ -3066,35 +3068,35 @@
           <a:p>
             <a:pPr lvl="0"/>
             <a:r>
-              <a:rPr lang="fr-FR" smtClean="0"/>
+              <a:rPr lang="fr-FR"/>
               <a:t>Modifier les styles du texte du masque</a:t>
             </a:r>
           </a:p>
           <a:p>
             <a:pPr lvl="1"/>
             <a:r>
-              <a:rPr lang="fr-FR" smtClean="0"/>
+              <a:rPr lang="fr-FR"/>
               <a:t>Deuxième niveau</a:t>
             </a:r>
           </a:p>
           <a:p>
             <a:pPr lvl="2"/>
             <a:r>
-              <a:rPr lang="fr-FR" smtClean="0"/>
+              <a:rPr lang="fr-FR"/>
               <a:t>Troisième niveau</a:t>
             </a:r>
           </a:p>
           <a:p>
             <a:pPr lvl="3"/>
             <a:r>
-              <a:rPr lang="fr-FR" smtClean="0"/>
+              <a:rPr lang="fr-FR"/>
               <a:t>Quatrième niveau</a:t>
             </a:r>
           </a:p>
           <a:p>
             <a:pPr lvl="4"/>
             <a:r>
-              <a:rPr lang="fr-FR" smtClean="0"/>
+              <a:rPr lang="fr-FR"/>
               <a:t>Cinquième niveau</a:t>
             </a:r>
             <a:endParaRPr lang="en-US" dirty="0"/>
@@ -3118,7 +3120,7 @@
           <a:p>
             <a:fld id="{4C3DC8E8-D6EF-42BD-939F-587419C538B1}" type="datetimeFigureOut">
               <a:rPr lang="fr-FR" smtClean="0"/>
-              <a:t>05/02/2019</a:t>
+              <a:t>16/04/2019</a:t>
             </a:fld>
             <a:endParaRPr lang="fr-FR"/>
           </a:p>
@@ -3242,7 +3244,7 @@
           <a:lstStyle/>
           <a:p>
             <a:r>
-              <a:rPr lang="fr-FR" smtClean="0"/>
+              <a:rPr lang="fr-FR"/>
               <a:t>Modifiez le style du titre</a:t>
             </a:r>
             <a:endParaRPr lang="en-US" dirty="0"/>
@@ -3266,35 +3268,35 @@
           <a:p>
             <a:pPr lvl="0"/>
             <a:r>
-              <a:rPr lang="fr-FR" smtClean="0"/>
+              <a:rPr lang="fr-FR"/>
               <a:t>Modifier les styles du texte du masque</a:t>
             </a:r>
           </a:p>
           <a:p>
             <a:pPr lvl="1"/>
             <a:r>
-              <a:rPr lang="fr-FR" smtClean="0"/>
+              <a:rPr lang="fr-FR"/>
               <a:t>Deuxième niveau</a:t>
             </a:r>
           </a:p>
           <a:p>
             <a:pPr lvl="2"/>
             <a:r>
-              <a:rPr lang="fr-FR" smtClean="0"/>
+              <a:rPr lang="fr-FR"/>
               <a:t>Troisième niveau</a:t>
             </a:r>
           </a:p>
           <a:p>
             <a:pPr lvl="3"/>
             <a:r>
-              <a:rPr lang="fr-FR" smtClean="0"/>
+              <a:rPr lang="fr-FR"/>
               <a:t>Quatrième niveau</a:t>
             </a:r>
           </a:p>
           <a:p>
             <a:pPr lvl="4"/>
             <a:r>
-              <a:rPr lang="fr-FR" smtClean="0"/>
+              <a:rPr lang="fr-FR"/>
               <a:t>Cinquième niveau</a:t>
             </a:r>
             <a:endParaRPr lang="en-US" dirty="0"/>
@@ -3318,7 +3320,7 @@
           <a:p>
             <a:fld id="{4C3DC8E8-D6EF-42BD-939F-587419C538B1}" type="datetimeFigureOut">
               <a:rPr lang="fr-FR" smtClean="0"/>
-              <a:t>05/02/2019</a:t>
+              <a:t>16/04/2019</a:t>
             </a:fld>
             <a:endParaRPr lang="fr-FR"/>
           </a:p>
@@ -3451,7 +3453,7 @@
           </a:lstStyle>
           <a:p>
             <a:r>
-              <a:rPr lang="fr-FR" smtClean="0"/>
+              <a:rPr lang="fr-FR"/>
               <a:t>Modifiez le style du titre</a:t>
             </a:r>
             <a:endParaRPr lang="en-US" dirty="0"/>
@@ -3571,7 +3573,7 @@
           <a:p>
             <a:pPr lvl="0"/>
             <a:r>
-              <a:rPr lang="fr-FR" smtClean="0"/>
+              <a:rPr lang="fr-FR"/>
               <a:t>Modifier les styles du texte du masque</a:t>
             </a:r>
           </a:p>
@@ -3594,7 +3596,7 @@
           <a:p>
             <a:fld id="{4C3DC8E8-D6EF-42BD-939F-587419C538B1}" type="datetimeFigureOut">
               <a:rPr lang="fr-FR" smtClean="0"/>
-              <a:t>05/02/2019</a:t>
+              <a:t>16/04/2019</a:t>
             </a:fld>
             <a:endParaRPr lang="fr-FR"/>
           </a:p>
@@ -3718,7 +3720,7 @@
           <a:lstStyle/>
           <a:p>
             <a:r>
-              <a:rPr lang="fr-FR" smtClean="0"/>
+              <a:rPr lang="fr-FR"/>
               <a:t>Modifiez le style du titre</a:t>
             </a:r>
             <a:endParaRPr lang="en-US" dirty="0"/>
@@ -3749,35 +3751,35 @@
           <a:p>
             <a:pPr lvl="0"/>
             <a:r>
-              <a:rPr lang="fr-FR" smtClean="0"/>
+              <a:rPr lang="fr-FR"/>
               <a:t>Modifier les styles du texte du masque</a:t>
             </a:r>
           </a:p>
           <a:p>
             <a:pPr lvl="1"/>
             <a:r>
-              <a:rPr lang="fr-FR" smtClean="0"/>
+              <a:rPr lang="fr-FR"/>
               <a:t>Deuxième niveau</a:t>
             </a:r>
           </a:p>
           <a:p>
             <a:pPr lvl="2"/>
             <a:r>
-              <a:rPr lang="fr-FR" smtClean="0"/>
+              <a:rPr lang="fr-FR"/>
               <a:t>Troisième niveau</a:t>
             </a:r>
           </a:p>
           <a:p>
             <a:pPr lvl="3"/>
             <a:r>
-              <a:rPr lang="fr-FR" smtClean="0"/>
+              <a:rPr lang="fr-FR"/>
               <a:t>Quatrième niveau</a:t>
             </a:r>
           </a:p>
           <a:p>
             <a:pPr lvl="4"/>
             <a:r>
-              <a:rPr lang="fr-FR" smtClean="0"/>
+              <a:rPr lang="fr-FR"/>
               <a:t>Cinquième niveau</a:t>
             </a:r>
             <a:endParaRPr lang="en-US" dirty="0"/>
@@ -3808,35 +3810,35 @@
           <a:p>
             <a:pPr lvl="0"/>
             <a:r>
-              <a:rPr lang="fr-FR" smtClean="0"/>
+              <a:rPr lang="fr-FR"/>
               <a:t>Modifier les styles du texte du masque</a:t>
             </a:r>
           </a:p>
           <a:p>
             <a:pPr lvl="1"/>
             <a:r>
-              <a:rPr lang="fr-FR" smtClean="0"/>
+              <a:rPr lang="fr-FR"/>
               <a:t>Deuxième niveau</a:t>
             </a:r>
           </a:p>
           <a:p>
             <a:pPr lvl="2"/>
             <a:r>
-              <a:rPr lang="fr-FR" smtClean="0"/>
+              <a:rPr lang="fr-FR"/>
               <a:t>Troisième niveau</a:t>
             </a:r>
           </a:p>
           <a:p>
             <a:pPr lvl="3"/>
             <a:r>
-              <a:rPr lang="fr-FR" smtClean="0"/>
+              <a:rPr lang="fr-FR"/>
               <a:t>Quatrième niveau</a:t>
             </a:r>
           </a:p>
           <a:p>
             <a:pPr lvl="4"/>
             <a:r>
-              <a:rPr lang="fr-FR" smtClean="0"/>
+              <a:rPr lang="fr-FR"/>
               <a:t>Cinquième niveau</a:t>
             </a:r>
             <a:endParaRPr lang="en-US" dirty="0"/>
@@ -3860,7 +3862,7 @@
           <a:p>
             <a:fld id="{4C3DC8E8-D6EF-42BD-939F-587419C538B1}" type="datetimeFigureOut">
               <a:rPr lang="fr-FR" smtClean="0"/>
-              <a:t>05/02/2019</a:t>
+              <a:t>16/04/2019</a:t>
             </a:fld>
             <a:endParaRPr lang="fr-FR"/>
           </a:p>
@@ -3958,7 +3960,7 @@
           </a:lstStyle>
           <a:p>
             <a:r>
-              <a:rPr lang="fr-FR" smtClean="0"/>
+              <a:rPr lang="fr-FR"/>
               <a:t>Modifiez le style du titre</a:t>
             </a:r>
             <a:endParaRPr lang="en-US" dirty="0"/>
@@ -4056,35 +4058,35 @@
           <a:p>
             <a:pPr lvl="0"/>
             <a:r>
-              <a:rPr lang="fr-FR" smtClean="0"/>
+              <a:rPr lang="fr-FR"/>
               <a:t>Modifier les styles du texte du masque</a:t>
             </a:r>
           </a:p>
           <a:p>
             <a:pPr lvl="1"/>
             <a:r>
-              <a:rPr lang="fr-FR" smtClean="0"/>
+              <a:rPr lang="fr-FR"/>
               <a:t>Deuxième niveau</a:t>
             </a:r>
           </a:p>
           <a:p>
             <a:pPr lvl="2"/>
             <a:r>
-              <a:rPr lang="fr-FR" smtClean="0"/>
+              <a:rPr lang="fr-FR"/>
               <a:t>Troisième niveau</a:t>
             </a:r>
           </a:p>
           <a:p>
             <a:pPr lvl="3"/>
             <a:r>
-              <a:rPr lang="fr-FR" smtClean="0"/>
+              <a:rPr lang="fr-FR"/>
               <a:t>Quatrième niveau</a:t>
             </a:r>
           </a:p>
           <a:p>
             <a:pPr lvl="4"/>
             <a:r>
-              <a:rPr lang="fr-FR" smtClean="0"/>
+              <a:rPr lang="fr-FR"/>
               <a:t>Cinquième niveau</a:t>
             </a:r>
             <a:endParaRPr lang="en-US" dirty="0"/>
@@ -4182,35 +4184,35 @@
           <a:p>
             <a:pPr lvl="0"/>
             <a:r>
-              <a:rPr lang="fr-FR" smtClean="0"/>
+              <a:rPr lang="fr-FR"/>
               <a:t>Modifier les styles du texte du masque</a:t>
             </a:r>
           </a:p>
           <a:p>
             <a:pPr lvl="1"/>
             <a:r>
-              <a:rPr lang="fr-FR" smtClean="0"/>
+              <a:rPr lang="fr-FR"/>
               <a:t>Deuxième niveau</a:t>
             </a:r>
           </a:p>
           <a:p>
             <a:pPr lvl="2"/>
             <a:r>
-              <a:rPr lang="fr-FR" smtClean="0"/>
+              <a:rPr lang="fr-FR"/>
               <a:t>Troisième niveau</a:t>
             </a:r>
           </a:p>
           <a:p>
             <a:pPr lvl="3"/>
             <a:r>
-              <a:rPr lang="fr-FR" smtClean="0"/>
+              <a:rPr lang="fr-FR"/>
               <a:t>Quatrième niveau</a:t>
             </a:r>
           </a:p>
           <a:p>
             <a:pPr lvl="4"/>
             <a:r>
-              <a:rPr lang="fr-FR" smtClean="0"/>
+              <a:rPr lang="fr-FR"/>
               <a:t>Cinquième niveau</a:t>
             </a:r>
             <a:endParaRPr lang="en-US" dirty="0"/>
@@ -4234,7 +4236,7 @@
           <a:p>
             <a:fld id="{4C3DC8E8-D6EF-42BD-939F-587419C538B1}" type="datetimeFigureOut">
               <a:rPr lang="fr-FR" smtClean="0"/>
-              <a:t>05/02/2019</a:t>
+              <a:t>16/04/2019</a:t>
             </a:fld>
             <a:endParaRPr lang="fr-FR"/>
           </a:p>
@@ -4358,7 +4360,7 @@
           <a:lstStyle/>
           <a:p>
             <a:r>
-              <a:rPr lang="fr-FR" smtClean="0"/>
+              <a:rPr lang="fr-FR"/>
               <a:t>Modifiez le style du titre</a:t>
             </a:r>
             <a:endParaRPr lang="en-US" dirty="0"/>
@@ -4382,7 +4384,7 @@
           <a:p>
             <a:fld id="{4C3DC8E8-D6EF-42BD-939F-587419C538B1}" type="datetimeFigureOut">
               <a:rPr lang="fr-FR" smtClean="0"/>
-              <a:t>05/02/2019</a:t>
+              <a:t>16/04/2019</a:t>
             </a:fld>
             <a:endParaRPr lang="fr-FR"/>
           </a:p>
@@ -4507,7 +4509,7 @@
           <a:p>
             <a:fld id="{4C3DC8E8-D6EF-42BD-939F-587419C538B1}" type="datetimeFigureOut">
               <a:rPr lang="fr-FR" smtClean="0"/>
-              <a:t>05/02/2019</a:t>
+              <a:t>16/04/2019</a:t>
             </a:fld>
             <a:endParaRPr lang="fr-FR"/>
           </a:p>
@@ -4642,7 +4644,7 @@
           </a:lstStyle>
           <a:p>
             <a:r>
-              <a:rPr lang="fr-FR" smtClean="0"/>
+              <a:rPr lang="fr-FR"/>
               <a:t>Modifiez le style du titre</a:t>
             </a:r>
             <a:endParaRPr lang="en-US" dirty="0"/>
@@ -4673,35 +4675,35 @@
           <a:p>
             <a:pPr lvl="0"/>
             <a:r>
-              <a:rPr lang="fr-FR" smtClean="0"/>
+              <a:rPr lang="fr-FR"/>
               <a:t>Modifier les styles du texte du masque</a:t>
             </a:r>
           </a:p>
           <a:p>
             <a:pPr lvl="1"/>
             <a:r>
-              <a:rPr lang="fr-FR" smtClean="0"/>
+              <a:rPr lang="fr-FR"/>
               <a:t>Deuxième niveau</a:t>
             </a:r>
           </a:p>
           <a:p>
             <a:pPr lvl="2"/>
             <a:r>
-              <a:rPr lang="fr-FR" smtClean="0"/>
+              <a:rPr lang="fr-FR"/>
               <a:t>Troisième niveau</a:t>
             </a:r>
           </a:p>
           <a:p>
             <a:pPr lvl="3"/>
             <a:r>
-              <a:rPr lang="fr-FR" smtClean="0"/>
+              <a:rPr lang="fr-FR"/>
               <a:t>Quatrième niveau</a:t>
             </a:r>
           </a:p>
           <a:p>
             <a:pPr lvl="4"/>
             <a:r>
-              <a:rPr lang="fr-FR" smtClean="0"/>
+              <a:rPr lang="fr-FR"/>
               <a:t>Cinquième niveau</a:t>
             </a:r>
             <a:endParaRPr lang="en-US" dirty="0"/>
@@ -4769,7 +4771,7 @@
           <a:p>
             <a:pPr lvl="0"/>
             <a:r>
-              <a:rPr lang="fr-FR" smtClean="0"/>
+              <a:rPr lang="fr-FR"/>
               <a:t>Modifier les styles du texte du masque</a:t>
             </a:r>
           </a:p>
@@ -4792,7 +4794,7 @@
           <a:p>
             <a:fld id="{4C3DC8E8-D6EF-42BD-939F-587419C538B1}" type="datetimeFigureOut">
               <a:rPr lang="fr-FR" smtClean="0"/>
-              <a:t>05/02/2019</a:t>
+              <a:t>16/04/2019</a:t>
             </a:fld>
             <a:endParaRPr lang="fr-FR"/>
           </a:p>
@@ -4927,7 +4929,7 @@
           </a:lstStyle>
           <a:p>
             <a:r>
-              <a:rPr lang="fr-FR" smtClean="0"/>
+              <a:rPr lang="fr-FR"/>
               <a:t>Modifiez le style du titre</a:t>
             </a:r>
             <a:endParaRPr lang="en-US" dirty="0"/>
@@ -5025,7 +5027,7 @@
           </a:lstStyle>
           <a:p>
             <a:r>
-              <a:rPr lang="fr-FR" smtClean="0"/>
+              <a:rPr lang="fr-FR"/>
               <a:t>Cliquez sur l'icône pour ajouter une image</a:t>
             </a:r>
             <a:endParaRPr lang="en-US" dirty="0"/>
@@ -5093,7 +5095,7 @@
           <a:p>
             <a:pPr lvl="0"/>
             <a:r>
-              <a:rPr lang="fr-FR" smtClean="0"/>
+              <a:rPr lang="fr-FR"/>
               <a:t>Modifier les styles du texte du masque</a:t>
             </a:r>
           </a:p>
@@ -5116,7 +5118,7 @@
           <a:p>
             <a:fld id="{4C3DC8E8-D6EF-42BD-939F-587419C538B1}" type="datetimeFigureOut">
               <a:rPr lang="fr-FR" smtClean="0"/>
-              <a:t>05/02/2019</a:t>
+              <a:t>16/04/2019</a:t>
             </a:fld>
             <a:endParaRPr lang="fr-FR"/>
           </a:p>
@@ -5226,7 +5228,7 @@
           <a:lstStyle/>
           <a:p>
             <a:r>
-              <a:rPr lang="fr-FR" smtClean="0"/>
+              <a:rPr lang="fr-FR"/>
               <a:t>Modifiez le style du titre</a:t>
             </a:r>
             <a:endParaRPr lang="en-US" dirty="0"/>
@@ -5260,35 +5262,35 @@
           <a:p>
             <a:pPr lvl="0"/>
             <a:r>
-              <a:rPr lang="fr-FR" smtClean="0"/>
+              <a:rPr lang="fr-FR"/>
               <a:t>Modifier les styles du texte du masque</a:t>
             </a:r>
           </a:p>
           <a:p>
             <a:pPr lvl="1"/>
             <a:r>
-              <a:rPr lang="fr-FR" smtClean="0"/>
+              <a:rPr lang="fr-FR"/>
               <a:t>Deuxième niveau</a:t>
             </a:r>
           </a:p>
           <a:p>
             <a:pPr lvl="2"/>
             <a:r>
-              <a:rPr lang="fr-FR" smtClean="0"/>
+              <a:rPr lang="fr-FR"/>
               <a:t>Troisième niveau</a:t>
             </a:r>
           </a:p>
           <a:p>
             <a:pPr lvl="3"/>
             <a:r>
-              <a:rPr lang="fr-FR" smtClean="0"/>
+              <a:rPr lang="fr-FR"/>
               <a:t>Quatrième niveau</a:t>
             </a:r>
           </a:p>
           <a:p>
             <a:pPr lvl="4"/>
             <a:r>
-              <a:rPr lang="fr-FR" smtClean="0"/>
+              <a:rPr lang="fr-FR"/>
               <a:t>Cinquième niveau</a:t>
             </a:r>
             <a:endParaRPr lang="en-US" dirty="0"/>
@@ -5330,7 +5332,7 @@
           <a:p>
             <a:fld id="{4C3DC8E8-D6EF-42BD-939F-587419C538B1}" type="datetimeFigureOut">
               <a:rPr lang="fr-FR" smtClean="0"/>
-              <a:t>05/02/2019</a:t>
+              <a:t>16/04/2019</a:t>
             </a:fld>
             <a:endParaRPr lang="fr-FR"/>
           </a:p>
@@ -5859,25 +5861,24 @@
           <a:lstStyle/>
           <a:p>
             <a:r>
-              <a:rPr lang="fr-FR" dirty="0" smtClean="0"/>
+              <a:rPr lang="fr-FR" dirty="0"/>
               <a:t>Projet Informatique</a:t>
             </a:r>
             <a:br>
-              <a:rPr lang="fr-FR" dirty="0" smtClean="0"/>
+              <a:rPr lang="fr-FR" dirty="0"/>
             </a:br>
             <a:r>
-              <a:rPr lang="fr-FR" dirty="0" smtClean="0"/>
+              <a:rPr lang="fr-FR" dirty="0"/>
               <a:t>3</a:t>
             </a:r>
             <a:r>
-              <a:rPr lang="fr-FR" baseline="30000" dirty="0" smtClean="0"/>
+              <a:rPr lang="fr-FR" baseline="30000" dirty="0"/>
               <a:t>ème</a:t>
             </a:r>
             <a:r>
-              <a:rPr lang="fr-FR" dirty="0" smtClean="0"/>
+              <a:rPr lang="fr-FR" dirty="0"/>
               <a:t> année</a:t>
             </a:r>
-            <a:endParaRPr lang="fr-FR" dirty="0"/>
           </a:p>
         </p:txBody>
       </p:sp>
@@ -5897,10 +5898,9 @@
           <a:lstStyle/>
           <a:p>
             <a:r>
-              <a:rPr lang="fr-FR" dirty="0" smtClean="0"/>
+              <a:rPr lang="fr-FR" dirty="0"/>
               <a:t>Stéphane Fardoux</a:t>
             </a:r>
-            <a:endParaRPr lang="fr-FR" dirty="0"/>
           </a:p>
         </p:txBody>
       </p:sp>
@@ -5928,7 +5928,7 @@
           <a:p>
             <a:pPr algn="ctr"/>
             <a:r>
-              <a:rPr lang="fr-FR" sz="13800" b="1" spc="50" dirty="0" smtClean="0">
+              <a:rPr lang="fr-FR" sz="13800" b="1" spc="50" dirty="0">
                 <a:ln w="0"/>
                 <a:solidFill>
                   <a:schemeClr val="bg2">
@@ -5946,22 +5946,6 @@
               </a:rPr>
               <a:t>Battle IA</a:t>
             </a:r>
-            <a:endParaRPr lang="fr-FR" sz="13800" b="1" spc="50" dirty="0">
-              <a:ln w="0"/>
-              <a:solidFill>
-                <a:schemeClr val="bg2">
-                  <a:lumMod val="60000"/>
-                  <a:lumOff val="40000"/>
-                </a:schemeClr>
-              </a:solidFill>
-              <a:effectLst>
-                <a:innerShdw blurRad="63500" dist="50800" dir="13500000">
-                  <a:srgbClr val="000000">
-                    <a:alpha val="50000"/>
-                  </a:srgbClr>
-                </a:innerShdw>
-              </a:effectLst>
-            </a:endParaRPr>
           </a:p>
         </p:txBody>
       </p:sp>
@@ -6011,10 +5995,9 @@
           <a:lstStyle/>
           <a:p>
             <a:r>
-              <a:rPr lang="fr-FR" dirty="0" smtClean="0"/>
-              <a:t>Capsule d’énergie</a:t>
+              <a:rPr lang="fr-FR" dirty="0"/>
+              <a:t>Vie</a:t>
             </a:r>
-            <a:endParaRPr lang="fr-FR" dirty="0"/>
           </a:p>
         </p:txBody>
       </p:sp>
@@ -6034,29 +6017,36 @@
           <a:lstStyle/>
           <a:p>
             <a:r>
-              <a:rPr lang="fr-FR" dirty="0" smtClean="0"/>
-              <a:t>Sur le terrain de jeu, il est possible de trouver des capsules d’énergie.</a:t>
+              <a:rPr lang="fr-FR" dirty="0"/>
+              <a:t>Un BOT n’a qu’un seule vie</a:t>
             </a:r>
           </a:p>
           <a:p>
             <a:r>
-              <a:rPr lang="fr-FR" dirty="0" smtClean="0"/>
-              <a:t>Il suffit de passer sur une capsule d’énergie pour en récupérer le contenu.</a:t>
+              <a:rPr lang="fr-FR" dirty="0"/>
+              <a:t>Il perd sa vie :</a:t>
             </a:r>
           </a:p>
           <a:p>
+            <a:pPr lvl="1"/>
             <a:r>
-              <a:rPr lang="fr-FR" dirty="0" smtClean="0"/>
-              <a:t>Des capsules d’énergie apparaitront de façon aléatoire sur le terrain.</a:t>
+              <a:rPr lang="fr-FR" dirty="0"/>
+              <a:t>Lorsque son niveau d’énergie tombe à zéro</a:t>
             </a:r>
-            <a:endParaRPr lang="fr-FR" dirty="0"/>
+          </a:p>
+          <a:p>
+            <a:pPr lvl="1"/>
+            <a:r>
+              <a:rPr lang="fr-FR" dirty="0"/>
+              <a:t>Lorsqu’il se prend un coup directement alors que son bouclier de défense est désactivé</a:t>
+            </a:r>
           </a:p>
         </p:txBody>
       </p:sp>
     </p:spTree>
     <p:extLst>
       <p:ext uri="{BB962C8B-B14F-4D97-AF65-F5344CB8AC3E}">
-        <p14:creationId xmlns:p14="http://schemas.microsoft.com/office/powerpoint/2010/main" val="494784568"/>
+        <p14:creationId xmlns:p14="http://schemas.microsoft.com/office/powerpoint/2010/main" val="1341023225"/>
       </p:ext>
     </p:extLst>
   </p:cSld>
@@ -6099,10 +6089,235 @@
           <a:lstStyle/>
           <a:p>
             <a:r>
-              <a:rPr lang="fr-FR" dirty="0" smtClean="0"/>
+              <a:rPr lang="fr-FR" dirty="0"/>
+              <a:t>Energie</a:t>
+            </a:r>
+          </a:p>
+        </p:txBody>
+      </p:sp>
+      <p:sp>
+        <p:nvSpPr>
+          <p:cNvPr id="3" name="Espace réservé du contenu 2"/>
+          <p:cNvSpPr>
+            <a:spLocks noGrp="1"/>
+          </p:cNvSpPr>
+          <p:nvPr>
+            <p:ph idx="1"/>
+          </p:nvPr>
+        </p:nvSpPr>
+        <p:spPr/>
+        <p:txBody>
+          <a:bodyPr/>
+          <a:lstStyle/>
+          <a:p>
+            <a:r>
+              <a:rPr lang="fr-FR" dirty="0"/>
+              <a:t>Chaque BOT démarre avec 100 unités d’énergie</a:t>
+            </a:r>
+          </a:p>
+          <a:p>
+            <a:r>
+              <a:rPr lang="fr-FR" dirty="0"/>
+              <a:t>Un BOT a perdu si sa réserve d’énergie tombe à zéro</a:t>
+            </a:r>
+          </a:p>
+          <a:p>
+            <a:r>
+              <a:rPr lang="fr-FR" dirty="0"/>
+              <a:t>Il n’y a pas de limite de stockage de l’énergie</a:t>
+            </a:r>
+          </a:p>
+          <a:p>
+            <a:r>
+              <a:rPr lang="fr-FR" dirty="0"/>
+              <a:t>Il y a perte au minimum de 1 unité d’énergie à chaque tour, même sans aucune détection, ni action effectuée</a:t>
+            </a:r>
+          </a:p>
+          <a:p>
+            <a:r>
+              <a:rPr lang="fr-FR" dirty="0"/>
+              <a:t>L’énergie est consommé par la détection</a:t>
+            </a:r>
+          </a:p>
+          <a:p>
+            <a:r>
+              <a:rPr lang="fr-FR" dirty="0"/>
+              <a:t>L’énergie est consommé par les actions</a:t>
+            </a:r>
+          </a:p>
+          <a:p>
+            <a:r>
+              <a:rPr lang="fr-FR" dirty="0"/>
+              <a:t>De l’énergie peut être récupérée sur le terrain</a:t>
+            </a:r>
+          </a:p>
+        </p:txBody>
+      </p:sp>
+      <p:pic>
+        <p:nvPicPr>
+          <p:cNvPr id="5" name="Image 4"/>
+          <p:cNvPicPr>
+            <a:picLocks noChangeAspect="1"/>
+          </p:cNvPicPr>
+          <p:nvPr/>
+        </p:nvPicPr>
+        <p:blipFill>
+          <a:blip r:embed="rId2" cstate="print">
+            <a:extLst>
+              <a:ext uri="{28A0092B-C50C-407E-A947-70E740481C1C}">
+                <a14:useLocalDpi xmlns:a14="http://schemas.microsoft.com/office/drawing/2010/main" val="0"/>
+              </a:ext>
+            </a:extLst>
+          </a:blip>
+          <a:stretch>
+            <a:fillRect/>
+          </a:stretch>
+        </p:blipFill>
+        <p:spPr>
+          <a:xfrm>
+            <a:off x="7910119" y="846896"/>
+            <a:ext cx="1439411" cy="1439411"/>
+          </a:xfrm>
+          <a:prstGeom prst="rect">
+            <a:avLst/>
+          </a:prstGeom>
+        </p:spPr>
+      </p:pic>
+    </p:spTree>
+    <p:extLst>
+      <p:ext uri="{BB962C8B-B14F-4D97-AF65-F5344CB8AC3E}">
+        <p14:creationId xmlns:p14="http://schemas.microsoft.com/office/powerpoint/2010/main" val="2285094419"/>
+      </p:ext>
+    </p:extLst>
+  </p:cSld>
+  <p:clrMapOvr>
+    <a:masterClrMapping/>
+  </p:clrMapOvr>
+</p:sld>
+</file>
+
+<file path=ppt/slides/slide12.xml><?xml version="1.0" encoding="utf-8"?>
+<p:sld xmlns:a="http://schemas.openxmlformats.org/drawingml/2006/main" xmlns:r="http://schemas.openxmlformats.org/officeDocument/2006/relationships" xmlns:p="http://schemas.openxmlformats.org/presentationml/2006/main">
+  <p:cSld>
+    <p:spTree>
+      <p:nvGrpSpPr>
+        <p:cNvPr id="1" name=""/>
+        <p:cNvGrpSpPr/>
+        <p:nvPr/>
+      </p:nvGrpSpPr>
+      <p:grpSpPr>
+        <a:xfrm>
+          <a:off x="0" y="0"/>
+          <a:ext cx="0" cy="0"/>
+          <a:chOff x="0" y="0"/>
+          <a:chExt cx="0" cy="0"/>
+        </a:xfrm>
+      </p:grpSpPr>
+      <p:sp>
+        <p:nvSpPr>
+          <p:cNvPr id="2" name="Titre 1"/>
+          <p:cNvSpPr>
+            <a:spLocks noGrp="1"/>
+          </p:cNvSpPr>
+          <p:nvPr>
+            <p:ph type="title"/>
+          </p:nvPr>
+        </p:nvSpPr>
+        <p:spPr/>
+        <p:txBody>
+          <a:bodyPr/>
+          <a:lstStyle/>
+          <a:p>
+            <a:r>
+              <a:rPr lang="fr-FR" dirty="0"/>
+              <a:t>Capsule d’énergie</a:t>
+            </a:r>
+          </a:p>
+        </p:txBody>
+      </p:sp>
+      <p:sp>
+        <p:nvSpPr>
+          <p:cNvPr id="3" name="Espace réservé du contenu 2"/>
+          <p:cNvSpPr>
+            <a:spLocks noGrp="1"/>
+          </p:cNvSpPr>
+          <p:nvPr>
+            <p:ph idx="1"/>
+          </p:nvPr>
+        </p:nvSpPr>
+        <p:spPr/>
+        <p:txBody>
+          <a:bodyPr/>
+          <a:lstStyle/>
+          <a:p>
+            <a:r>
+              <a:rPr lang="fr-FR" dirty="0"/>
+              <a:t>Sur le terrain de jeu, il est possible de trouver des capsules d’énergie.</a:t>
+            </a:r>
+          </a:p>
+          <a:p>
+            <a:r>
+              <a:rPr lang="fr-FR" dirty="0"/>
+              <a:t>Il suffit de passer sur une capsule d’énergie pour en récupérer le contenu.</a:t>
+            </a:r>
+          </a:p>
+          <a:p>
+            <a:r>
+              <a:rPr lang="fr-FR" dirty="0"/>
+              <a:t>Des capsules d’énergie apparaitront de façon aléatoire sur le terrain.</a:t>
+            </a:r>
+          </a:p>
+        </p:txBody>
+      </p:sp>
+    </p:spTree>
+    <p:extLst>
+      <p:ext uri="{BB962C8B-B14F-4D97-AF65-F5344CB8AC3E}">
+        <p14:creationId xmlns:p14="http://schemas.microsoft.com/office/powerpoint/2010/main" val="494784568"/>
+      </p:ext>
+    </p:extLst>
+  </p:cSld>
+  <p:clrMapOvr>
+    <a:masterClrMapping/>
+  </p:clrMapOvr>
+</p:sld>
+</file>
+
+<file path=ppt/slides/slide13.xml><?xml version="1.0" encoding="utf-8"?>
+<p:sld xmlns:a="http://schemas.openxmlformats.org/drawingml/2006/main" xmlns:r="http://schemas.openxmlformats.org/officeDocument/2006/relationships" xmlns:p="http://schemas.openxmlformats.org/presentationml/2006/main">
+  <p:cSld>
+    <p:spTree>
+      <p:nvGrpSpPr>
+        <p:cNvPr id="1" name=""/>
+        <p:cNvGrpSpPr/>
+        <p:nvPr/>
+      </p:nvGrpSpPr>
+      <p:grpSpPr>
+        <a:xfrm>
+          <a:off x="0" y="0"/>
+          <a:ext cx="0" cy="0"/>
+          <a:chOff x="0" y="0"/>
+          <a:chExt cx="0" cy="0"/>
+        </a:xfrm>
+      </p:grpSpPr>
+      <p:sp>
+        <p:nvSpPr>
+          <p:cNvPr id="2" name="Titre 1"/>
+          <p:cNvSpPr>
+            <a:spLocks noGrp="1"/>
+          </p:cNvSpPr>
+          <p:nvPr>
+            <p:ph type="title"/>
+          </p:nvPr>
+        </p:nvSpPr>
+        <p:spPr/>
+        <p:txBody>
+          <a:bodyPr/>
+          <a:lstStyle/>
+          <a:p>
+            <a:r>
+              <a:rPr lang="fr-FR" dirty="0"/>
               <a:t>Capteur</a:t>
             </a:r>
-            <a:endParaRPr lang="fr-FR" dirty="0"/>
           </a:p>
         </p:txBody>
       </p:sp>
@@ -6124,22 +6339,22 @@
           <a:lstStyle/>
           <a:p>
             <a:r>
-              <a:rPr lang="fr-FR" dirty="0" smtClean="0"/>
+              <a:rPr lang="fr-FR" dirty="0"/>
               <a:t>Au début de chaque tour, il faut indiquer l’énergie injectée dans le capteur environnant</a:t>
             </a:r>
           </a:p>
           <a:p>
             <a:pPr lvl="1"/>
             <a:r>
-              <a:rPr lang="fr-FR" dirty="0" smtClean="0"/>
+              <a:rPr lang="fr-FR" dirty="0"/>
               <a:t>0 : aucune information ne sera captée</a:t>
             </a:r>
           </a:p>
           <a:p>
             <a:pPr lvl="1"/>
             <a:r>
-              <a:rPr lang="fr-FR" dirty="0" smtClean="0"/>
-              <a:t>1 à n : les informations d’une distance de # case(s) seront captées</a:t>
+              <a:rPr lang="fr-FR" dirty="0"/>
+              <a:t>1 à 255 : les informations d’une distance de # case(s) seront captées</a:t>
             </a:r>
           </a:p>
           <a:p>
@@ -23875,7 +24090,7 @@
 </p:sld>
 </file>
 
-<file path=ppt/slides/slide12.xml><?xml version="1.0" encoding="utf-8"?>
+<file path=ppt/slides/slide14.xml><?xml version="1.0" encoding="utf-8"?>
 <p:sld xmlns:a="http://schemas.openxmlformats.org/drawingml/2006/main" xmlns:r="http://schemas.openxmlformats.org/officeDocument/2006/relationships" xmlns:p="http://schemas.openxmlformats.org/presentationml/2006/main">
   <p:cSld>
     <p:spTree>
@@ -23908,10 +24123,9 @@
           <a:lstStyle/>
           <a:p>
             <a:r>
-              <a:rPr lang="fr-FR" dirty="0" smtClean="0"/>
+              <a:rPr lang="fr-FR" dirty="0"/>
               <a:t>Déplacement</a:t>
             </a:r>
-            <a:endParaRPr lang="fr-FR" dirty="0"/>
           </a:p>
         </p:txBody>
       </p:sp>
@@ -23931,23 +24145,22 @@
           <a:lstStyle/>
           <a:p>
             <a:r>
-              <a:rPr lang="fr-FR" dirty="0" smtClean="0"/>
+              <a:rPr lang="fr-FR" dirty="0"/>
               <a:t>Il est possible de se déplacer d’une case dans les 8 directions</a:t>
             </a:r>
           </a:p>
           <a:p>
             <a:r>
-              <a:rPr lang="fr-FR" dirty="0" smtClean="0"/>
-              <a:t>Il faut que la case soit vide ou qu’elle contient</a:t>
+              <a:rPr lang="fr-FR" dirty="0"/>
+              <a:t>Il faut que la case soit vide ou qu’elle contienne</a:t>
             </a:r>
           </a:p>
           <a:p>
             <a:pPr lvl="1"/>
             <a:r>
-              <a:rPr lang="fr-FR" dirty="0" smtClean="0"/>
+              <a:rPr lang="fr-FR" dirty="0"/>
               <a:t>Une capsule d’énergie : l’énergie contenu dans cette capsule est alors absorbée</a:t>
             </a:r>
-            <a:endParaRPr lang="fr-FR" dirty="0"/>
           </a:p>
         </p:txBody>
       </p:sp>
@@ -24115,222 +24328,6 @@
 </p:sld>
 </file>
 
-<file path=ppt/slides/slide13.xml><?xml version="1.0" encoding="utf-8"?>
-<p:sld xmlns:a="http://schemas.openxmlformats.org/drawingml/2006/main" xmlns:r="http://schemas.openxmlformats.org/officeDocument/2006/relationships" xmlns:p="http://schemas.openxmlformats.org/presentationml/2006/main">
-  <p:cSld>
-    <p:spTree>
-      <p:nvGrpSpPr>
-        <p:cNvPr id="1" name=""/>
-        <p:cNvGrpSpPr/>
-        <p:nvPr/>
-      </p:nvGrpSpPr>
-      <p:grpSpPr>
-        <a:xfrm>
-          <a:off x="0" y="0"/>
-          <a:ext cx="0" cy="0"/>
-          <a:chOff x="0" y="0"/>
-          <a:chExt cx="0" cy="0"/>
-        </a:xfrm>
-      </p:grpSpPr>
-      <p:sp>
-        <p:nvSpPr>
-          <p:cNvPr id="2" name="Titre 1"/>
-          <p:cNvSpPr>
-            <a:spLocks noGrp="1"/>
-          </p:cNvSpPr>
-          <p:nvPr>
-            <p:ph type="title"/>
-          </p:nvPr>
-        </p:nvSpPr>
-        <p:spPr/>
-        <p:txBody>
-          <a:bodyPr/>
-          <a:lstStyle/>
-          <a:p>
-            <a:r>
-              <a:rPr lang="fr-FR" dirty="0" smtClean="0"/>
-              <a:t>Protection</a:t>
-            </a:r>
-            <a:endParaRPr lang="fr-FR" dirty="0"/>
-          </a:p>
-        </p:txBody>
-      </p:sp>
-      <p:sp>
-        <p:nvSpPr>
-          <p:cNvPr id="3" name="Espace réservé du contenu 2"/>
-          <p:cNvSpPr>
-            <a:spLocks noGrp="1"/>
-          </p:cNvSpPr>
-          <p:nvPr>
-            <p:ph idx="1"/>
-          </p:nvPr>
-        </p:nvSpPr>
-        <p:spPr/>
-        <p:txBody>
-          <a:bodyPr>
-            <a:normAutofit/>
-          </a:bodyPr>
-          <a:lstStyle/>
-          <a:p>
-            <a:r>
-              <a:rPr lang="fr-FR" dirty="0" smtClean="0"/>
-              <a:t>Il est possible d’activer un bouclier protecteur. On lui attribuera un certain niveau de puissance qui seront déduit en unité d’énergie pour l’activation</a:t>
-            </a:r>
-          </a:p>
-          <a:p>
-            <a:r>
-              <a:rPr lang="fr-FR" dirty="0" smtClean="0"/>
-              <a:t>A chaque tour il consommera 1 unité d’énergie pour maintenir son niveau de puissance</a:t>
-            </a:r>
-          </a:p>
-          <a:p>
-            <a:r>
-              <a:rPr lang="fr-FR" dirty="0" smtClean="0"/>
-              <a:t>Si l’on se prend 1 coup, il perd 1 unité de puissance</a:t>
-            </a:r>
-          </a:p>
-          <a:p>
-            <a:r>
-              <a:rPr lang="fr-FR" dirty="0" smtClean="0"/>
-              <a:t>Si sa puissance tombe à zéro, il est désactivé</a:t>
-            </a:r>
-          </a:p>
-          <a:p>
-            <a:r>
-              <a:rPr lang="fr-FR" dirty="0" smtClean="0"/>
-              <a:t>Il est possible de réinjecter des unités d’énergie afin d’augmenter le niveau de puissance</a:t>
-            </a:r>
-          </a:p>
-          <a:p>
-            <a:r>
-              <a:rPr lang="fr-FR" dirty="0" smtClean="0"/>
-              <a:t>Lors de la désactivation du bouclier, on récupère en unité d’énergie le niveau de puissance actuelle du bouclier</a:t>
-            </a:r>
-            <a:endParaRPr lang="fr-FR" dirty="0"/>
-          </a:p>
-        </p:txBody>
-      </p:sp>
-    </p:spTree>
-    <p:extLst>
-      <p:ext uri="{BB962C8B-B14F-4D97-AF65-F5344CB8AC3E}">
-        <p14:creationId xmlns:p14="http://schemas.microsoft.com/office/powerpoint/2010/main" val="2860328843"/>
-      </p:ext>
-    </p:extLst>
-  </p:cSld>
-  <p:clrMapOvr>
-    <a:masterClrMapping/>
-  </p:clrMapOvr>
-</p:sld>
-</file>
-
-<file path=ppt/slides/slide14.xml><?xml version="1.0" encoding="utf-8"?>
-<p:sld xmlns:a="http://schemas.openxmlformats.org/drawingml/2006/main" xmlns:r="http://schemas.openxmlformats.org/officeDocument/2006/relationships" xmlns:p="http://schemas.openxmlformats.org/presentationml/2006/main">
-  <p:cSld>
-    <p:spTree>
-      <p:nvGrpSpPr>
-        <p:cNvPr id="1" name=""/>
-        <p:cNvGrpSpPr/>
-        <p:nvPr/>
-      </p:nvGrpSpPr>
-      <p:grpSpPr>
-        <a:xfrm>
-          <a:off x="0" y="0"/>
-          <a:ext cx="0" cy="0"/>
-          <a:chOff x="0" y="0"/>
-          <a:chExt cx="0" cy="0"/>
-        </a:xfrm>
-      </p:grpSpPr>
-      <p:sp>
-        <p:nvSpPr>
-          <p:cNvPr id="2" name="Titre 1"/>
-          <p:cNvSpPr>
-            <a:spLocks noGrp="1"/>
-          </p:cNvSpPr>
-          <p:nvPr>
-            <p:ph type="title"/>
-          </p:nvPr>
-        </p:nvSpPr>
-        <p:spPr/>
-        <p:txBody>
-          <a:bodyPr/>
-          <a:lstStyle/>
-          <a:p>
-            <a:r>
-              <a:rPr lang="fr-FR" dirty="0" smtClean="0"/>
-              <a:t>Champ occultant</a:t>
-            </a:r>
-            <a:endParaRPr lang="fr-FR" dirty="0"/>
-          </a:p>
-        </p:txBody>
-      </p:sp>
-      <p:sp>
-        <p:nvSpPr>
-          <p:cNvPr id="3" name="Espace réservé du contenu 2"/>
-          <p:cNvSpPr>
-            <a:spLocks noGrp="1"/>
-          </p:cNvSpPr>
-          <p:nvPr>
-            <p:ph idx="1"/>
-          </p:nvPr>
-        </p:nvSpPr>
-        <p:spPr/>
-        <p:txBody>
-          <a:bodyPr>
-            <a:normAutofit/>
-          </a:bodyPr>
-          <a:lstStyle/>
-          <a:p>
-            <a:r>
-              <a:rPr lang="fr-FR" dirty="0" smtClean="0"/>
-              <a:t>Il est possible de se rendre invisible en activant un champ occultant. On lui attribuera un certain niveau de puissance qui seront déduit en unité d’énergie pour l’activation. Ce niveau de puissance est la distance sur laquelle l’occultation est active.</a:t>
-            </a:r>
-          </a:p>
-          <a:p>
-            <a:pPr lvl="1"/>
-            <a:r>
-              <a:rPr lang="fr-FR" dirty="0" smtClean="0"/>
-              <a:t>Exemple : Avec un niveau 3, un ennemi à une distance &lt;= 3 ne nous détectera pas, un ennemi plus loin que 3 pourra nous détecter</a:t>
-            </a:r>
-          </a:p>
-          <a:p>
-            <a:r>
-              <a:rPr lang="fr-FR" dirty="0" smtClean="0"/>
-              <a:t>A chaque tour il consommera 1 unité d’énergie pour maintenir son niveau de puissance</a:t>
-            </a:r>
-          </a:p>
-          <a:p>
-            <a:r>
-              <a:rPr lang="fr-FR" dirty="0" smtClean="0"/>
-              <a:t>Si l’on se prend 1 coup, il est automatiquement désactivé (et son énergie est perdue)</a:t>
-            </a:r>
-          </a:p>
-          <a:p>
-            <a:r>
-              <a:rPr lang="fr-FR" dirty="0" smtClean="0"/>
-              <a:t>Lors de la désactivation du champ occultant, on récupère en unité d’énergie le niveau de puissance du champ occultant</a:t>
-            </a:r>
-          </a:p>
-          <a:p>
-            <a:endParaRPr lang="fr-FR" dirty="0" smtClean="0"/>
-          </a:p>
-          <a:p>
-            <a:endParaRPr lang="fr-FR" dirty="0"/>
-          </a:p>
-        </p:txBody>
-      </p:sp>
-    </p:spTree>
-    <p:extLst>
-      <p:ext uri="{BB962C8B-B14F-4D97-AF65-F5344CB8AC3E}">
-        <p14:creationId xmlns:p14="http://schemas.microsoft.com/office/powerpoint/2010/main" val="1046025100"/>
-      </p:ext>
-    </p:extLst>
-  </p:cSld>
-  <p:clrMapOvr>
-    <a:masterClrMapping/>
-  </p:clrMapOvr>
-</p:sld>
-</file>
-
 <file path=ppt/slides/slide15.xml><?xml version="1.0" encoding="utf-8"?>
 <p:sld xmlns:a="http://schemas.openxmlformats.org/drawingml/2006/main" xmlns:r="http://schemas.openxmlformats.org/officeDocument/2006/relationships" xmlns:p="http://schemas.openxmlformats.org/presentationml/2006/main">
   <p:cSld>
@@ -24364,10 +24361,9 @@
           <a:lstStyle/>
           <a:p>
             <a:r>
-              <a:rPr lang="fr-FR" dirty="0" smtClean="0"/>
-              <a:t>Site web</a:t>
+              <a:rPr lang="fr-FR" dirty="0"/>
+              <a:t>Protection</a:t>
             </a:r>
-            <a:endParaRPr lang="fr-FR" dirty="0"/>
           </a:p>
         </p:txBody>
       </p:sp>
@@ -24383,79 +24379,52 @@
         </p:nvSpPr>
         <p:spPr/>
         <p:txBody>
-          <a:bodyPr/>
+          <a:bodyPr>
+            <a:normAutofit/>
+          </a:bodyPr>
           <a:lstStyle/>
           <a:p>
             <a:r>
-              <a:rPr lang="fr-FR" dirty="0" smtClean="0"/>
-              <a:t>Inscription : login/</a:t>
-            </a:r>
-            <a:r>
-              <a:rPr lang="fr-FR" dirty="0" err="1" smtClean="0"/>
-              <a:t>password</a:t>
-            </a:r>
-            <a:endParaRPr lang="fr-FR" dirty="0" smtClean="0"/>
-          </a:p>
-          <a:p>
-            <a:r>
-              <a:rPr lang="fr-FR" dirty="0" smtClean="0"/>
-              <a:t>Donne un nom de TEAM, obtient un GUID</a:t>
+              <a:rPr lang="fr-FR" dirty="0"/>
+              <a:t>Il est possible d’activer un bouclier protecteur. On lui attribuera un certain niveau de puissance qui sera déduit en unité d’énergie pour l’activation</a:t>
             </a:r>
           </a:p>
           <a:p>
             <a:r>
-              <a:rPr lang="fr-FR" dirty="0" smtClean="0"/>
-              <a:t>Pour cette TEAM, création d’un robot : donne un nom au robot, obtient un GUID</a:t>
+              <a:rPr lang="fr-FR" dirty="0"/>
+              <a:t>A chaque tour il consommera 1 unité d’énergie pour maintenir son niveau de puissance</a:t>
             </a:r>
           </a:p>
           <a:p>
             <a:r>
-              <a:rPr lang="fr-FR" dirty="0" smtClean="0"/>
-              <a:t>Robot</a:t>
+              <a:rPr lang="fr-FR" dirty="0"/>
+              <a:t>Si l’on se prend 1 coup, il perd 1 unité de puissance</a:t>
             </a:r>
           </a:p>
           <a:p>
-            <a:pPr lvl="1"/>
             <a:r>
-              <a:rPr lang="fr-FR" dirty="0" smtClean="0"/>
-              <a:t>Nb de démarrage</a:t>
+              <a:rPr lang="fr-FR" dirty="0"/>
+              <a:t>Si sa puissance tombe à zéro, il est désactivé</a:t>
             </a:r>
           </a:p>
           <a:p>
-            <a:pPr lvl="1"/>
             <a:r>
-              <a:rPr lang="fr-FR" dirty="0" smtClean="0"/>
-              <a:t>Liste des parties avec le détail</a:t>
+              <a:rPr lang="fr-FR" dirty="0"/>
+              <a:t>Il est possible de réinjecter des unités d’énergie afin d’augmenter le niveau de puissance</a:t>
             </a:r>
           </a:p>
           <a:p>
-            <a:pPr lvl="2"/>
             <a:r>
-              <a:rPr lang="fr-FR" dirty="0" smtClean="0"/>
-              <a:t>Durée</a:t>
+              <a:rPr lang="fr-FR" dirty="0"/>
+              <a:t>Lors de la désactivation du bouclier, on récupère en unité d’énergie le niveau de puissance actuelle du bouclier</a:t>
             </a:r>
-          </a:p>
-          <a:p>
-            <a:pPr lvl="2"/>
-            <a:r>
-              <a:rPr lang="fr-FR" dirty="0" smtClean="0"/>
-              <a:t>Score</a:t>
-            </a:r>
-          </a:p>
-          <a:p>
-            <a:pPr lvl="2"/>
-            <a:r>
-              <a:rPr lang="fr-FR" dirty="0" smtClean="0"/>
-              <a:t>Etc. …</a:t>
-            </a:r>
-            <a:endParaRPr lang="fr-FR" dirty="0"/>
           </a:p>
         </p:txBody>
       </p:sp>
     </p:spTree>
     <p:extLst>
       <p:ext uri="{BB962C8B-B14F-4D97-AF65-F5344CB8AC3E}">
-        <p14:creationId xmlns:p14="http://schemas.microsoft.com/office/powerpoint/2010/main" val="419007796"/>
+        <p14:creationId xmlns:p14="http://schemas.microsoft.com/office/powerpoint/2010/main" val="2860328843"/>
       </p:ext>
     </p:extLst>
   </p:cSld>
@@ -24498,10 +24467,116 @@
           <a:lstStyle/>
           <a:p>
             <a:r>
-              <a:rPr lang="fr-FR" dirty="0" smtClean="0"/>
-              <a:t>Planning</a:t>
+              <a:rPr lang="fr-FR" dirty="0"/>
+              <a:t>Champ occultant</a:t>
             </a:r>
+          </a:p>
+        </p:txBody>
+      </p:sp>
+      <p:sp>
+        <p:nvSpPr>
+          <p:cNvPr id="3" name="Espace réservé du contenu 2"/>
+          <p:cNvSpPr>
+            <a:spLocks noGrp="1"/>
+          </p:cNvSpPr>
+          <p:nvPr>
+            <p:ph idx="1"/>
+          </p:nvPr>
+        </p:nvSpPr>
+        <p:spPr/>
+        <p:txBody>
+          <a:bodyPr>
+            <a:normAutofit/>
+          </a:bodyPr>
+          <a:lstStyle/>
+          <a:p>
+            <a:r>
+              <a:rPr lang="fr-FR" dirty="0"/>
+              <a:t>Il est possible de se rendre invisible en activant un champ occultant. On lui attribuera un certain niveau de puissance qui seront déduit en unité d’énergie pour l’activation. Ce niveau de puissance est la distance sur laquelle l’occultation est active.</a:t>
+            </a:r>
+          </a:p>
+          <a:p>
+            <a:pPr lvl="1"/>
+            <a:r>
+              <a:rPr lang="fr-FR" dirty="0"/>
+              <a:t>Exemple : Avec un niveau 3, un ennemi à une distance &lt;= 3 ne nous détectera pas, un ennemi plus loin que 3 pourra nous détecter</a:t>
+            </a:r>
+          </a:p>
+          <a:p>
+            <a:r>
+              <a:rPr lang="fr-FR" dirty="0"/>
+              <a:t>A chaque tour il consommera 1 unité d’énergie pour maintenir son niveau de puissance</a:t>
+            </a:r>
+          </a:p>
+          <a:p>
+            <a:r>
+              <a:rPr lang="fr-FR" dirty="0"/>
+              <a:t>Si l’on se prend 1 coup, il est automatiquement désactivé (et son énergie est perdue)</a:t>
+            </a:r>
+          </a:p>
+          <a:p>
+            <a:r>
+              <a:rPr lang="fr-FR" dirty="0"/>
+              <a:t>Lors de la désactivation du champ occultant, on récupère en unité d’énergie le niveau de puissance du champ occultant</a:t>
+            </a:r>
+          </a:p>
+          <a:p>
             <a:endParaRPr lang="fr-FR" dirty="0"/>
+          </a:p>
+          <a:p>
+            <a:endParaRPr lang="fr-FR" dirty="0"/>
+          </a:p>
+        </p:txBody>
+      </p:sp>
+    </p:spTree>
+    <p:extLst>
+      <p:ext uri="{BB962C8B-B14F-4D97-AF65-F5344CB8AC3E}">
+        <p14:creationId xmlns:p14="http://schemas.microsoft.com/office/powerpoint/2010/main" val="1046025100"/>
+      </p:ext>
+    </p:extLst>
+  </p:cSld>
+  <p:clrMapOvr>
+    <a:masterClrMapping/>
+  </p:clrMapOvr>
+</p:sld>
+</file>
+
+<file path=ppt/slides/slide17.xml><?xml version="1.0" encoding="utf-8"?>
+<p:sld xmlns:a="http://schemas.openxmlformats.org/drawingml/2006/main" xmlns:r="http://schemas.openxmlformats.org/officeDocument/2006/relationships" xmlns:p="http://schemas.openxmlformats.org/presentationml/2006/main">
+  <p:cSld>
+    <p:spTree>
+      <p:nvGrpSpPr>
+        <p:cNvPr id="1" name=""/>
+        <p:cNvGrpSpPr/>
+        <p:nvPr/>
+      </p:nvGrpSpPr>
+      <p:grpSpPr>
+        <a:xfrm>
+          <a:off x="0" y="0"/>
+          <a:ext cx="0" cy="0"/>
+          <a:chOff x="0" y="0"/>
+          <a:chExt cx="0" cy="0"/>
+        </a:xfrm>
+      </p:grpSpPr>
+      <p:sp>
+        <p:nvSpPr>
+          <p:cNvPr id="2" name="Titre 1"/>
+          <p:cNvSpPr>
+            <a:spLocks noGrp="1"/>
+          </p:cNvSpPr>
+          <p:nvPr>
+            <p:ph type="title"/>
+          </p:nvPr>
+        </p:nvSpPr>
+        <p:spPr/>
+        <p:txBody>
+          <a:bodyPr/>
+          <a:lstStyle/>
+          <a:p>
+            <a:r>
+              <a:rPr lang="fr-FR" dirty="0"/>
+              <a:t>Site web</a:t>
+            </a:r>
           </a:p>
         </p:txBody>
       </p:sp>
@@ -24521,73 +24596,205 @@
           <a:lstStyle/>
           <a:p>
             <a:r>
-              <a:rPr lang="fr-FR" dirty="0" smtClean="0"/>
+              <a:rPr lang="fr-FR" dirty="0"/>
+              <a:t>Inscription : login/</a:t>
+            </a:r>
+            <a:r>
+              <a:rPr lang="fr-FR" dirty="0" err="1"/>
+              <a:t>password</a:t>
+            </a:r>
+            <a:endParaRPr lang="fr-FR" dirty="0"/>
+          </a:p>
+          <a:p>
+            <a:r>
+              <a:rPr lang="fr-FR" dirty="0"/>
+              <a:t>Donne un nom de TEAM, obtient un GUID</a:t>
+            </a:r>
+          </a:p>
+          <a:p>
+            <a:r>
+              <a:rPr lang="fr-FR" dirty="0"/>
+              <a:t>Pour cette TEAM, création d’un robot : donne un nom au robot, obtient un GUID</a:t>
+            </a:r>
+          </a:p>
+          <a:p>
+            <a:r>
+              <a:rPr lang="fr-FR" dirty="0"/>
+              <a:t>Robot</a:t>
+            </a:r>
+          </a:p>
+          <a:p>
+            <a:pPr lvl="1"/>
+            <a:r>
+              <a:rPr lang="fr-FR" dirty="0"/>
+              <a:t>Nb de démarrage</a:t>
+            </a:r>
+          </a:p>
+          <a:p>
+            <a:pPr lvl="1"/>
+            <a:r>
+              <a:rPr lang="fr-FR" dirty="0"/>
+              <a:t>Liste des parties avec le détail</a:t>
+            </a:r>
+          </a:p>
+          <a:p>
+            <a:pPr lvl="2"/>
+            <a:r>
+              <a:rPr lang="fr-FR" dirty="0"/>
+              <a:t>Durée</a:t>
+            </a:r>
+          </a:p>
+          <a:p>
+            <a:pPr lvl="2"/>
+            <a:r>
+              <a:rPr lang="fr-FR" dirty="0"/>
+              <a:t>Score</a:t>
+            </a:r>
+          </a:p>
+          <a:p>
+            <a:pPr lvl="2"/>
+            <a:r>
+              <a:rPr lang="fr-FR" dirty="0"/>
+              <a:t>Etc. …</a:t>
+            </a:r>
+          </a:p>
+        </p:txBody>
+      </p:sp>
+    </p:spTree>
+    <p:extLst>
+      <p:ext uri="{BB962C8B-B14F-4D97-AF65-F5344CB8AC3E}">
+        <p14:creationId xmlns:p14="http://schemas.microsoft.com/office/powerpoint/2010/main" val="419007796"/>
+      </p:ext>
+    </p:extLst>
+  </p:cSld>
+  <p:clrMapOvr>
+    <a:masterClrMapping/>
+  </p:clrMapOvr>
+</p:sld>
+</file>
+
+<file path=ppt/slides/slide18.xml><?xml version="1.0" encoding="utf-8"?>
+<p:sld xmlns:a="http://schemas.openxmlformats.org/drawingml/2006/main" xmlns:r="http://schemas.openxmlformats.org/officeDocument/2006/relationships" xmlns:p="http://schemas.openxmlformats.org/presentationml/2006/main">
+  <p:cSld>
+    <p:spTree>
+      <p:nvGrpSpPr>
+        <p:cNvPr id="1" name=""/>
+        <p:cNvGrpSpPr/>
+        <p:nvPr/>
+      </p:nvGrpSpPr>
+      <p:grpSpPr>
+        <a:xfrm>
+          <a:off x="0" y="0"/>
+          <a:ext cx="0" cy="0"/>
+          <a:chOff x="0" y="0"/>
+          <a:chExt cx="0" cy="0"/>
+        </a:xfrm>
+      </p:grpSpPr>
+      <p:sp>
+        <p:nvSpPr>
+          <p:cNvPr id="2" name="Titre 1"/>
+          <p:cNvSpPr>
+            <a:spLocks noGrp="1"/>
+          </p:cNvSpPr>
+          <p:nvPr>
+            <p:ph type="title"/>
+          </p:nvPr>
+        </p:nvSpPr>
+        <p:spPr/>
+        <p:txBody>
+          <a:bodyPr/>
+          <a:lstStyle/>
+          <a:p>
+            <a:r>
+              <a:rPr lang="fr-FR" dirty="0"/>
+              <a:t>Planning</a:t>
+            </a:r>
+          </a:p>
+        </p:txBody>
+      </p:sp>
+      <p:sp>
+        <p:nvSpPr>
+          <p:cNvPr id="3" name="Espace réservé du contenu 2"/>
+          <p:cNvSpPr>
+            <a:spLocks noGrp="1"/>
+          </p:cNvSpPr>
+          <p:nvPr>
+            <p:ph idx="1"/>
+          </p:nvPr>
+        </p:nvSpPr>
+        <p:spPr/>
+        <p:txBody>
+          <a:bodyPr/>
+          <a:lstStyle/>
+          <a:p>
+            <a:r>
+              <a:rPr lang="fr-FR" dirty="0"/>
               <a:t>Semaine 1</a:t>
             </a:r>
           </a:p>
           <a:p>
             <a:pPr lvl="1"/>
             <a:r>
-              <a:rPr lang="fr-FR" dirty="0" smtClean="0"/>
+              <a:rPr lang="fr-FR" dirty="0"/>
               <a:t>Créer une IA</a:t>
             </a:r>
           </a:p>
           <a:p>
             <a:r>
-              <a:rPr lang="fr-FR" dirty="0" smtClean="0"/>
+              <a:rPr lang="fr-FR" dirty="0"/>
               <a:t>Semaine 2</a:t>
             </a:r>
           </a:p>
           <a:p>
             <a:pPr lvl="1"/>
             <a:r>
-              <a:rPr lang="fr-FR" dirty="0" smtClean="0"/>
+              <a:rPr lang="fr-FR" dirty="0"/>
               <a:t>Apprendre les </a:t>
             </a:r>
             <a:r>
-              <a:rPr lang="fr-FR" dirty="0" err="1" smtClean="0"/>
+              <a:rPr lang="fr-FR" dirty="0" err="1"/>
               <a:t>WebSockets</a:t>
             </a:r>
             <a:r>
-              <a:rPr lang="fr-FR" dirty="0" smtClean="0"/>
+              <a:rPr lang="fr-FR" dirty="0"/>
               <a:t> en </a:t>
             </a:r>
             <a:r>
-              <a:rPr lang="fr-FR" dirty="0" err="1" smtClean="0"/>
+              <a:rPr lang="fr-FR" dirty="0" err="1"/>
               <a:t>javascript</a:t>
             </a:r>
-            <a:endParaRPr lang="fr-FR" dirty="0" smtClean="0"/>
+            <a:endParaRPr lang="fr-FR" dirty="0"/>
           </a:p>
           <a:p>
             <a:r>
-              <a:rPr lang="fr-FR" dirty="0" smtClean="0"/>
+              <a:rPr lang="fr-FR" dirty="0"/>
               <a:t>Semaine 3</a:t>
             </a:r>
           </a:p>
           <a:p>
             <a:pPr lvl="1"/>
             <a:r>
-              <a:rPr lang="fr-FR" dirty="0" smtClean="0"/>
+              <a:rPr lang="fr-FR" dirty="0"/>
               <a:t>Créer une interface HTML/</a:t>
             </a:r>
             <a:r>
-              <a:rPr lang="fr-FR" dirty="0" err="1" smtClean="0"/>
+              <a:rPr lang="fr-FR" dirty="0" err="1"/>
               <a:t>css</a:t>
             </a:r>
             <a:r>
-              <a:rPr lang="fr-FR" dirty="0" smtClean="0"/>
+              <a:rPr lang="fr-FR" dirty="0"/>
               <a:t>/</a:t>
             </a:r>
             <a:r>
-              <a:rPr lang="fr-FR" dirty="0" err="1" smtClean="0"/>
+              <a:rPr lang="fr-FR" dirty="0" err="1"/>
               <a:t>js</a:t>
             </a:r>
             <a:r>
-              <a:rPr lang="fr-FR" dirty="0" smtClean="0"/>
+              <a:rPr lang="fr-FR" dirty="0"/>
               <a:t> avec les </a:t>
             </a:r>
             <a:r>
-              <a:rPr lang="fr-FR" dirty="0" err="1" smtClean="0"/>
+              <a:rPr lang="fr-FR" dirty="0" err="1"/>
               <a:t>WebSockets</a:t>
             </a:r>
             <a:endParaRPr lang="fr-FR" dirty="0"/>
@@ -24624,66 +24831,184 @@
           <a:chExt cx="0" cy="0"/>
         </a:xfrm>
       </p:grpSpPr>
+      <p:pic>
+        <p:nvPicPr>
+          <p:cNvPr id="2" name="Image 1">
+            <a:extLst>
+              <a:ext uri="{FF2B5EF4-FFF2-40B4-BE49-F238E27FC236}">
+                <a16:creationId xmlns:a16="http://schemas.microsoft.com/office/drawing/2014/main" id="{2F11EDC0-1068-4E84-8F77-C0A7E297E7D3}"/>
+              </a:ext>
+            </a:extLst>
+          </p:cNvPr>
+          <p:cNvPicPr>
+            <a:picLocks noChangeAspect="1"/>
+          </p:cNvPicPr>
+          <p:nvPr/>
+        </p:nvPicPr>
+        <p:blipFill>
+          <a:blip r:embed="rId2"/>
+          <a:stretch>
+            <a:fillRect/>
+          </a:stretch>
+        </p:blipFill>
+        <p:spPr>
+          <a:xfrm>
+            <a:off x="918661" y="2214859"/>
+            <a:ext cx="10586507" cy="3652343"/>
+          </a:xfrm>
+          <a:prstGeom prst="roundRect">
+            <a:avLst>
+              <a:gd name="adj" fmla="val 8594"/>
+            </a:avLst>
+          </a:prstGeom>
+          <a:solidFill>
+            <a:srgbClr val="FFFFFF">
+              <a:shade val="85000"/>
+            </a:srgbClr>
+          </a:solidFill>
+          <a:ln>
+            <a:noFill/>
+          </a:ln>
+          <a:effectLst>
+            <a:reflection blurRad="12700" stA="38000" endPos="28000" dist="5000" dir="5400000" sy="-100000" algn="bl" rotWithShape="0"/>
+          </a:effectLst>
+        </p:spPr>
+      </p:pic>
       <p:sp>
         <p:nvSpPr>
-          <p:cNvPr id="2" name="Titre 1"/>
-          <p:cNvSpPr>
-            <a:spLocks noGrp="1"/>
-          </p:cNvSpPr>
-          <p:nvPr>
-            <p:ph type="title"/>
-          </p:nvPr>
+          <p:cNvPr id="3" name="Rectangle 2">
+            <a:extLst>
+              <a:ext uri="{FF2B5EF4-FFF2-40B4-BE49-F238E27FC236}">
+                <a16:creationId xmlns:a16="http://schemas.microsoft.com/office/drawing/2014/main" id="{5989D9EF-0648-4165-91BF-B4827161E3DE}"/>
+              </a:ext>
+            </a:extLst>
+          </p:cNvPr>
+          <p:cNvSpPr/>
+          <p:nvPr/>
         </p:nvSpPr>
-        <p:spPr/>
+        <p:spPr>
+          <a:xfrm>
+            <a:off x="2260397" y="364812"/>
+            <a:ext cx="7512954" cy="2585323"/>
+          </a:xfrm>
+          <a:prstGeom prst="rect">
+            <a:avLst/>
+          </a:prstGeom>
+          <a:noFill/>
+        </p:spPr>
         <p:txBody>
-          <a:bodyPr/>
+          <a:bodyPr wrap="none" lIns="91440" tIns="45720" rIns="91440" bIns="45720">
+            <a:spAutoFit/>
+          </a:bodyPr>
           <a:lstStyle/>
           <a:p>
+            <a:pPr algn="ctr"/>
             <a:r>
-              <a:rPr lang="fr-FR" dirty="0" smtClean="0"/>
-              <a:t>Objectif</a:t>
-            </a:r>
-            <a:endParaRPr lang="fr-FR" dirty="0"/>
-          </a:p>
-        </p:txBody>
-      </p:sp>
-      <p:sp>
-        <p:nvSpPr>
-          <p:cNvPr id="3" name="Espace réservé du contenu 2"/>
-          <p:cNvSpPr>
-            <a:spLocks noGrp="1"/>
-          </p:cNvSpPr>
-          <p:nvPr>
-            <p:ph idx="1"/>
-          </p:nvPr>
-        </p:nvSpPr>
-        <p:spPr/>
-        <p:txBody>
-          <a:bodyPr/>
-          <a:lstStyle/>
-          <a:p>
-            <a:r>
-              <a:rPr lang="fr-FR" dirty="0" smtClean="0"/>
-              <a:t>Coder une I.A. en C</a:t>
+              <a:rPr lang="fr-FR" sz="5400" b="1" cap="none" spc="0" dirty="0">
+                <a:ln w="9525">
+                  <a:solidFill>
+                    <a:schemeClr val="bg1"/>
+                  </a:solidFill>
+                  <a:prstDash val="solid"/>
+                </a:ln>
+                <a:solidFill>
+                  <a:schemeClr val="tx1"/>
+                </a:solidFill>
+                <a:effectLst>
+                  <a:outerShdw blurRad="12700" dist="38100" dir="2700000" algn="tl" rotWithShape="0">
+                    <a:schemeClr val="bg1">
+                      <a:lumMod val="50000"/>
+                    </a:schemeClr>
+                  </a:outerShdw>
+                </a:effectLst>
+              </a:rPr>
+              <a:t>METTRE UN BEAU VISUEL</a:t>
             </a:r>
           </a:p>
           <a:p>
+            <a:pPr algn="ctr"/>
             <a:r>
-              <a:rPr lang="fr-FR" dirty="0" smtClean="0"/>
-              <a:t>Coder un affichage des informations de l’I.A. en html/</a:t>
+              <a:rPr lang="fr-FR" sz="5400" b="1" dirty="0">
+                <a:ln w="9525">
+                  <a:solidFill>
+                    <a:schemeClr val="bg1"/>
+                  </a:solidFill>
+                  <a:prstDash val="solid"/>
+                </a:ln>
+                <a:effectLst>
+                  <a:outerShdw blurRad="12700" dist="38100" dir="2700000" algn="tl" rotWithShape="0">
+                    <a:schemeClr val="bg1">
+                      <a:lumMod val="50000"/>
+                    </a:schemeClr>
+                  </a:outerShdw>
+                </a:effectLst>
+              </a:rPr>
+              <a:t>de la simulation</a:t>
             </a:r>
+            <a:endParaRPr lang="fr-FR" sz="5400" b="1" cap="none" spc="0" dirty="0">
+              <a:ln w="9525">
+                <a:solidFill>
+                  <a:schemeClr val="bg1"/>
+                </a:solidFill>
+                <a:prstDash val="solid"/>
+              </a:ln>
+              <a:solidFill>
+                <a:schemeClr val="tx1"/>
+              </a:solidFill>
+              <a:effectLst>
+                <a:outerShdw blurRad="12700" dist="38100" dir="2700000" algn="tl" rotWithShape="0">
+                  <a:schemeClr val="bg1">
+                    <a:lumMod val="50000"/>
+                  </a:schemeClr>
+                </a:outerShdw>
+              </a:effectLst>
+            </a:endParaRPr>
+          </a:p>
+          <a:p>
+            <a:pPr algn="ctr"/>
             <a:r>
-              <a:rPr lang="fr-FR" dirty="0" err="1" smtClean="0"/>
-              <a:t>css</a:t>
+              <a:rPr lang="fr-FR" sz="5400" b="1" dirty="0">
+                <a:ln w="9525">
+                  <a:solidFill>
+                    <a:schemeClr val="bg1"/>
+                  </a:solidFill>
+                  <a:prstDash val="solid"/>
+                </a:ln>
+                <a:effectLst>
+                  <a:outerShdw blurRad="12700" dist="38100" dir="2700000" algn="tl" rotWithShape="0">
+                    <a:schemeClr val="bg1">
+                      <a:lumMod val="50000"/>
+                    </a:schemeClr>
+                  </a:outerShdw>
+                </a:effectLst>
+              </a:rPr>
+              <a:t>avec bots et effets</a:t>
             </a:r>
-            <a:endParaRPr lang="fr-FR" dirty="0"/>
+            <a:endParaRPr lang="fr-FR" sz="5400" b="1" cap="none" spc="0" dirty="0">
+              <a:ln w="9525">
+                <a:solidFill>
+                  <a:schemeClr val="bg1"/>
+                </a:solidFill>
+                <a:prstDash val="solid"/>
+              </a:ln>
+              <a:solidFill>
+                <a:schemeClr val="tx1"/>
+              </a:solidFill>
+              <a:effectLst>
+                <a:outerShdw blurRad="12700" dist="38100" dir="2700000" algn="tl" rotWithShape="0">
+                  <a:schemeClr val="bg1">
+                    <a:lumMod val="50000"/>
+                  </a:schemeClr>
+                </a:outerShdw>
+              </a:effectLst>
+            </a:endParaRPr>
           </a:p>
         </p:txBody>
       </p:sp>
     </p:spTree>
     <p:extLst>
       <p:ext uri="{BB962C8B-B14F-4D97-AF65-F5344CB8AC3E}">
-        <p14:creationId xmlns:p14="http://schemas.microsoft.com/office/powerpoint/2010/main" val="559780682"/>
+        <p14:creationId xmlns:p14="http://schemas.microsoft.com/office/powerpoint/2010/main" val="364970401"/>
       </p:ext>
     </p:extLst>
   </p:cSld>
@@ -24726,10 +25051,9 @@
           <a:lstStyle/>
           <a:p>
             <a:r>
-              <a:rPr lang="fr-FR" dirty="0" smtClean="0"/>
-              <a:t>1 tour</a:t>
+              <a:rPr lang="fr-FR" dirty="0"/>
+              <a:t>Objectif</a:t>
             </a:r>
-            <a:endParaRPr lang="fr-FR" dirty="0"/>
           </a:p>
         </p:txBody>
       </p:sp>
@@ -24748,38 +25072,78 @@
           <a:bodyPr/>
           <a:lstStyle/>
           <a:p>
+            <a:pPr marL="342900" indent="-342900">
+              <a:buFont typeface="+mj-lt"/>
+              <a:buAutoNum type="arabicPeriod"/>
+            </a:pPr>
             <a:r>
-              <a:rPr lang="fr-FR" dirty="0" smtClean="0"/>
-              <a:t>Exécute la consommation d’énergie</a:t>
+              <a:rPr lang="fr-FR" dirty="0"/>
+              <a:t>Coder un BOT avec une I.A. en </a:t>
+            </a:r>
+            <a:r>
+              <a:rPr lang="fr-FR" dirty="0" err="1"/>
+              <a:t>language</a:t>
+            </a:r>
+            <a:r>
+              <a:rPr lang="fr-FR" dirty="0"/>
+              <a:t> C</a:t>
+            </a:r>
+          </a:p>
+          <a:p>
+            <a:pPr marL="342900" indent="-342900">
+              <a:buFont typeface="+mj-lt"/>
+              <a:buAutoNum type="arabicPeriod"/>
+            </a:pPr>
+            <a:r>
+              <a:rPr lang="fr-FR" dirty="0"/>
+              <a:t>Coder un rendu graphique des informations de votre I.A. en html/</a:t>
+            </a:r>
+            <a:r>
+              <a:rPr lang="fr-FR" dirty="0" err="1"/>
+              <a:t>css</a:t>
+            </a:r>
+            <a:endParaRPr lang="fr-FR" dirty="0"/>
+          </a:p>
+          <a:p>
+            <a:pPr marL="342900" indent="-342900">
+              <a:buFont typeface="+mj-lt"/>
+              <a:buAutoNum type="arabicPeriod"/>
+            </a:pPr>
+            <a:endParaRPr lang="fr-FR" dirty="0"/>
+          </a:p>
+          <a:p>
+            <a:pPr marL="0" indent="0">
+              <a:buNone/>
+            </a:pPr>
+            <a:r>
+              <a:rPr lang="fr-FR" dirty="0"/>
+              <a:t>Il vous est fourni</a:t>
             </a:r>
           </a:p>
           <a:p>
             <a:r>
-              <a:rPr lang="fr-FR" dirty="0" smtClean="0"/>
-              <a:t>Détermine le niveau de scan 0 à X</a:t>
+              <a:rPr lang="fr-FR" dirty="0"/>
+              <a:t>Le moteur d’exécution de la simulation</a:t>
             </a:r>
           </a:p>
           <a:p>
             <a:r>
-              <a:rPr lang="fr-FR" dirty="0" smtClean="0"/>
-              <a:t>Scan à lieu</a:t>
+              <a:rPr lang="fr-FR" dirty="0"/>
+              <a:t>Un rendu graphique de la simulation</a:t>
             </a:r>
           </a:p>
           <a:p>
             <a:r>
-              <a:rPr lang="fr-FR" dirty="0" smtClean="0"/>
-              <a:t>Détermine une action ou déplacement</a:t>
+              <a:rPr lang="fr-FR" dirty="0"/>
+              <a:t>Un BOT exemple </a:t>
             </a:r>
-          </a:p>
-          <a:p>
-            <a:endParaRPr lang="fr-FR" dirty="0"/>
           </a:p>
         </p:txBody>
       </p:sp>
     </p:spTree>
     <p:extLst>
       <p:ext uri="{BB962C8B-B14F-4D97-AF65-F5344CB8AC3E}">
-        <p14:creationId xmlns:p14="http://schemas.microsoft.com/office/powerpoint/2010/main" val="1059896031"/>
+        <p14:creationId xmlns:p14="http://schemas.microsoft.com/office/powerpoint/2010/main" val="559780682"/>
       </p:ext>
     </p:extLst>
   </p:cSld>
@@ -24790,6 +25154,121 @@
 </file>
 
 <file path=ppt/slides/slide4.xml><?xml version="1.0" encoding="utf-8"?>
+<p:sld xmlns:a="http://schemas.openxmlformats.org/drawingml/2006/main" xmlns:r="http://schemas.openxmlformats.org/officeDocument/2006/relationships" xmlns:p="http://schemas.openxmlformats.org/presentationml/2006/main">
+  <p:cSld>
+    <p:spTree>
+      <p:nvGrpSpPr>
+        <p:cNvPr id="1" name=""/>
+        <p:cNvGrpSpPr/>
+        <p:nvPr/>
+      </p:nvGrpSpPr>
+      <p:grpSpPr>
+        <a:xfrm>
+          <a:off x="0" y="0"/>
+          <a:ext cx="0" cy="0"/>
+          <a:chOff x="0" y="0"/>
+          <a:chExt cx="0" cy="0"/>
+        </a:xfrm>
+      </p:grpSpPr>
+      <p:sp>
+        <p:nvSpPr>
+          <p:cNvPr id="2" name="Titre 1">
+            <a:extLst>
+              <a:ext uri="{FF2B5EF4-FFF2-40B4-BE49-F238E27FC236}">
+                <a16:creationId xmlns:a16="http://schemas.microsoft.com/office/drawing/2014/main" id="{4AA46B0D-665C-4710-8CD3-D0BBB5157E64}"/>
+              </a:ext>
+            </a:extLst>
+          </p:cNvPr>
+          <p:cNvSpPr>
+            <a:spLocks noGrp="1"/>
+          </p:cNvSpPr>
+          <p:nvPr>
+            <p:ph type="title"/>
+          </p:nvPr>
+        </p:nvSpPr>
+        <p:spPr/>
+        <p:txBody>
+          <a:bodyPr/>
+          <a:lstStyle/>
+          <a:p>
+            <a:r>
+              <a:rPr lang="fr-FR" dirty="0"/>
+              <a:t>La simulation</a:t>
+            </a:r>
+          </a:p>
+        </p:txBody>
+      </p:sp>
+      <p:sp>
+        <p:nvSpPr>
+          <p:cNvPr id="3" name="Espace réservé du contenu 2">
+            <a:extLst>
+              <a:ext uri="{FF2B5EF4-FFF2-40B4-BE49-F238E27FC236}">
+                <a16:creationId xmlns:a16="http://schemas.microsoft.com/office/drawing/2014/main" id="{756323B1-5D0A-4169-8A1E-4402C2C19DAC}"/>
+              </a:ext>
+            </a:extLst>
+          </p:cNvPr>
+          <p:cNvSpPr>
+            <a:spLocks noGrp="1"/>
+          </p:cNvSpPr>
+          <p:nvPr>
+            <p:ph idx="1"/>
+          </p:nvPr>
+        </p:nvSpPr>
+        <p:spPr/>
+        <p:txBody>
+          <a:bodyPr/>
+          <a:lstStyle/>
+          <a:p>
+            <a:pPr marL="0" indent="0">
+              <a:buNone/>
+            </a:pPr>
+            <a:r>
+              <a:rPr lang="fr-FR" dirty="0"/>
+              <a:t>Le moteur d’exécution de la simulation fonctionne en mode console. Il affiche en format texte tout ce qu’il se passe.</a:t>
+            </a:r>
+          </a:p>
+          <a:p>
+            <a:pPr marL="0" indent="0">
+              <a:buNone/>
+            </a:pPr>
+            <a:r>
+              <a:rPr lang="fr-FR" dirty="0"/>
+              <a:t>Ce moteur supporte un nombre « infini » de </a:t>
+            </a:r>
+            <a:r>
+              <a:rPr lang="fr-FR" dirty="0" err="1"/>
+              <a:t>BOTs</a:t>
+            </a:r>
+            <a:r>
+              <a:rPr lang="fr-FR" dirty="0"/>
+              <a:t>. </a:t>
+            </a:r>
+          </a:p>
+          <a:p>
+            <a:pPr marL="0" indent="0">
+              <a:buNone/>
+            </a:pPr>
+            <a:r>
+              <a:rPr lang="fr-FR" dirty="0"/>
+              <a:t>Vous pilotez la simulation via quelques commandes simples.</a:t>
+            </a:r>
+          </a:p>
+        </p:txBody>
+      </p:sp>
+    </p:spTree>
+    <p:extLst>
+      <p:ext uri="{BB962C8B-B14F-4D97-AF65-F5344CB8AC3E}">
+        <p14:creationId xmlns:p14="http://schemas.microsoft.com/office/powerpoint/2010/main" val="2596449347"/>
+      </p:ext>
+    </p:extLst>
+  </p:cSld>
+  <p:clrMapOvr>
+    <a:masterClrMapping/>
+  </p:clrMapOvr>
+</p:sld>
+</file>
+
+<file path=ppt/slides/slide5.xml><?xml version="1.0" encoding="utf-8"?>
 <p:sld xmlns:a="http://schemas.openxmlformats.org/drawingml/2006/main" xmlns:r="http://schemas.openxmlformats.org/officeDocument/2006/relationships" xmlns:p="http://schemas.openxmlformats.org/presentationml/2006/main">
   <p:cSld>
     <p:spTree>
@@ -24822,10 +25301,137 @@
           <a:lstStyle/>
           <a:p>
             <a:r>
-              <a:rPr lang="fr-FR" dirty="0" smtClean="0"/>
-              <a:t>Terrain de jeu</a:t>
+              <a:rPr lang="fr-FR" dirty="0"/>
+              <a:t>1 tour de jeu</a:t>
             </a:r>
+          </a:p>
+        </p:txBody>
+      </p:sp>
+      <p:sp>
+        <p:nvSpPr>
+          <p:cNvPr id="3" name="Espace réservé du contenu 2"/>
+          <p:cNvSpPr>
+            <a:spLocks noGrp="1"/>
+          </p:cNvSpPr>
+          <p:nvPr>
+            <p:ph idx="1"/>
+          </p:nvPr>
+        </p:nvSpPr>
+        <p:spPr/>
+        <p:txBody>
+          <a:bodyPr/>
+          <a:lstStyle/>
+          <a:p>
+            <a:pPr marL="0" indent="0">
+              <a:buNone/>
+            </a:pPr>
+            <a:r>
+              <a:rPr lang="fr-FR" dirty="0"/>
+              <a:t>Un tour de jeu consiste en une séquence de communication entre le simulateur et un bot.</a:t>
+            </a:r>
+          </a:p>
+          <a:p>
+            <a:r>
+              <a:rPr lang="fr-FR" dirty="0"/>
+              <a:t>Simulateur : exécute la consommation d’énergie pour un BOT</a:t>
+            </a:r>
+          </a:p>
+          <a:p>
+            <a:r>
+              <a:rPr lang="fr-FR" dirty="0"/>
+              <a:t>BOT : détermine le niveau de scan de 0 à 255</a:t>
+            </a:r>
+          </a:p>
+          <a:p>
+            <a:r>
+              <a:rPr lang="fr-FR" dirty="0"/>
+              <a:t>Simulateur : le scan à lieu</a:t>
+            </a:r>
+          </a:p>
+          <a:p>
+            <a:r>
+              <a:rPr lang="fr-FR" dirty="0"/>
+              <a:t>BOT : Détermine une action (aucune, déplacer, tirer, bouclier, se cacher, …)</a:t>
+            </a:r>
+          </a:p>
+          <a:p>
+            <a:r>
+              <a:rPr lang="fr-FR" dirty="0"/>
+              <a:t>Simulateur : exécution de l’action et applique les changements s’il y en a</a:t>
+            </a:r>
+          </a:p>
+          <a:p>
+            <a:pPr marL="0" indent="0">
+              <a:buNone/>
+            </a:pPr>
+            <a:r>
+              <a:rPr lang="fr-FR" dirty="0"/>
+              <a:t>Le simulateur passe au BOT suivant.</a:t>
+            </a:r>
+          </a:p>
+          <a:p>
+            <a:pPr marL="0" indent="0">
+              <a:buNone/>
+            </a:pPr>
+            <a:r>
+              <a:rPr lang="fr-FR" dirty="0"/>
+              <a:t>Chaque BOT est prévenu directement dès qu’une de ses caractéristiques est modifiée.</a:t>
+            </a:r>
+          </a:p>
+          <a:p>
             <a:endParaRPr lang="fr-FR" dirty="0"/>
+          </a:p>
+        </p:txBody>
+      </p:sp>
+    </p:spTree>
+    <p:extLst>
+      <p:ext uri="{BB962C8B-B14F-4D97-AF65-F5344CB8AC3E}">
+        <p14:creationId xmlns:p14="http://schemas.microsoft.com/office/powerpoint/2010/main" val="1059896031"/>
+      </p:ext>
+    </p:extLst>
+  </p:cSld>
+  <p:clrMapOvr>
+    <a:masterClrMapping/>
+  </p:clrMapOvr>
+</p:sld>
+</file>
+
+<file path=ppt/slides/slide6.xml><?xml version="1.0" encoding="utf-8"?>
+<p:sld xmlns:a="http://schemas.openxmlformats.org/drawingml/2006/main" xmlns:r="http://schemas.openxmlformats.org/officeDocument/2006/relationships" xmlns:p="http://schemas.openxmlformats.org/presentationml/2006/main">
+  <p:cSld>
+    <p:spTree>
+      <p:nvGrpSpPr>
+        <p:cNvPr id="1" name=""/>
+        <p:cNvGrpSpPr/>
+        <p:nvPr/>
+      </p:nvGrpSpPr>
+      <p:grpSpPr>
+        <a:xfrm>
+          <a:off x="0" y="0"/>
+          <a:ext cx="0" cy="0"/>
+          <a:chOff x="0" y="0"/>
+          <a:chExt cx="0" cy="0"/>
+        </a:xfrm>
+      </p:grpSpPr>
+      <p:sp>
+        <p:nvSpPr>
+          <p:cNvPr id="2" name="Titre 1"/>
+          <p:cNvSpPr>
+            <a:spLocks noGrp="1"/>
+          </p:cNvSpPr>
+          <p:nvPr>
+            <p:ph type="title"/>
+          </p:nvPr>
+        </p:nvSpPr>
+        <p:spPr/>
+        <p:txBody>
+          <a:bodyPr/>
+          <a:lstStyle/>
+          <a:p>
+            <a:r>
+              <a:rPr lang="fr-FR" dirty="0"/>
+              <a:t>Terrain de simulation</a:t>
+            </a:r>
           </a:p>
         </p:txBody>
       </p:sp>
@@ -24845,28 +25451,27 @@
           <a:lstStyle/>
           <a:p>
             <a:r>
-              <a:rPr lang="fr-FR" dirty="0" smtClean="0"/>
-              <a:t>Constitué par des carrés</a:t>
+              <a:rPr lang="fr-FR" dirty="0"/>
+              <a:t>Le terrain est constitué par des carrés, il est entièrement bordé</a:t>
             </a:r>
           </a:p>
           <a:p>
             <a:r>
-              <a:rPr lang="fr-FR" dirty="0" smtClean="0"/>
-              <a:t>La superficie peut être différente d’une partie à une autre</a:t>
+              <a:rPr lang="fr-FR" dirty="0"/>
+              <a:t>La superficie du terrain peut être différente d’une partie à une autre</a:t>
             </a:r>
           </a:p>
           <a:p>
             <a:r>
-              <a:rPr lang="fr-FR" dirty="0" smtClean="0"/>
-              <a:t>Une unité occupe 1 carré</a:t>
+              <a:rPr lang="fr-FR" dirty="0"/>
+              <a:t>Une unité (1 BOT) occupe 1 carré</a:t>
             </a:r>
           </a:p>
           <a:p>
             <a:r>
-              <a:rPr lang="fr-FR" dirty="0" smtClean="0"/>
+              <a:rPr lang="fr-FR" dirty="0"/>
               <a:t>Un résonateur occupe 4 carrés</a:t>
             </a:r>
-            <a:endParaRPr lang="fr-FR" dirty="0"/>
           </a:p>
         </p:txBody>
       </p:sp>
@@ -24878,7 +25483,7 @@
         </p:nvGrpSpPr>
         <p:grpSpPr>
           <a:xfrm>
-            <a:off x="6683106" y="3581143"/>
+            <a:off x="8230552" y="732436"/>
             <a:ext cx="2297309" cy="2307929"/>
             <a:chOff x="6683106" y="3581143"/>
             <a:chExt cx="2297309" cy="2307929"/>
@@ -25034,7 +25639,7 @@
 </p:sld>
 </file>
 
-<file path=ppt/slides/slide5.xml><?xml version="1.0" encoding="utf-8"?>
+<file path=ppt/slides/slide7.xml><?xml version="1.0" encoding="utf-8"?>
 <p:sld xmlns:a="http://schemas.openxmlformats.org/drawingml/2006/main" xmlns:r="http://schemas.openxmlformats.org/officeDocument/2006/relationships" xmlns:p="http://schemas.openxmlformats.org/presentationml/2006/main">
   <p:cSld>
     <p:spTree>
@@ -25067,10 +25672,9 @@
           <a:lstStyle/>
           <a:p>
             <a:r>
-              <a:rPr lang="fr-FR" dirty="0" smtClean="0"/>
+              <a:rPr lang="fr-FR" dirty="0"/>
               <a:t>Exemple d’un terrain de jeu</a:t>
             </a:r>
-            <a:endParaRPr lang="fr-FR" dirty="0"/>
           </a:p>
         </p:txBody>
       </p:sp>
@@ -25111,7 +25715,7 @@
 </p:sld>
 </file>
 
-<file path=ppt/slides/slide6.xml><?xml version="1.0" encoding="utf-8"?>
+<file path=ppt/slides/slide8.xml><?xml version="1.0" encoding="utf-8"?>
 <p:sld xmlns:a="http://schemas.openxmlformats.org/drawingml/2006/main" xmlns:r="http://schemas.openxmlformats.org/officeDocument/2006/relationships" xmlns:p="http://schemas.openxmlformats.org/presentationml/2006/main">
   <p:cSld>
     <p:spTree>
@@ -25163,17 +25767,16 @@
           <a:p>
             <a:pPr algn="ctr"/>
             <a:r>
-              <a:rPr lang="fr-FR" dirty="0" smtClean="0"/>
+              <a:rPr lang="fr-FR" dirty="0"/>
               <a:t>Moteur d’exécution globale</a:t>
             </a:r>
             <a:br>
-              <a:rPr lang="fr-FR" dirty="0" smtClean="0"/>
+              <a:rPr lang="fr-FR" dirty="0"/>
             </a:br>
             <a:r>
-              <a:rPr lang="fr-FR" dirty="0" smtClean="0"/>
+              <a:rPr lang="fr-FR" dirty="0"/>
               <a:t>multi-joueurs</a:t>
             </a:r>
-            <a:endParaRPr lang="fr-FR" dirty="0"/>
           </a:p>
         </p:txBody>
       </p:sp>
@@ -25251,17 +25854,16 @@
           <a:p>
             <a:pPr algn="ctr"/>
             <a:r>
-              <a:rPr lang="fr-FR" dirty="0" smtClean="0"/>
+              <a:rPr lang="fr-FR" dirty="0"/>
               <a:t>Client pour</a:t>
             </a:r>
             <a:br>
-              <a:rPr lang="fr-FR" dirty="0" smtClean="0"/>
+              <a:rPr lang="fr-FR" dirty="0"/>
             </a:br>
             <a:r>
-              <a:rPr lang="fr-FR" dirty="0" smtClean="0"/>
+              <a:rPr lang="fr-FR" dirty="0"/>
               <a:t>rendu global</a:t>
             </a:r>
-            <a:endParaRPr lang="fr-FR" dirty="0"/>
           </a:p>
         </p:txBody>
       </p:sp>
@@ -25300,17 +25902,16 @@
           <a:p>
             <a:pPr algn="ctr"/>
             <a:r>
-              <a:rPr lang="fr-FR" dirty="0" smtClean="0"/>
+              <a:rPr lang="fr-FR" dirty="0"/>
               <a:t>IA à</a:t>
             </a:r>
           </a:p>
           <a:p>
             <a:pPr algn="ctr"/>
             <a:r>
-              <a:rPr lang="fr-FR" dirty="0" smtClean="0"/>
+              <a:rPr lang="fr-FR" dirty="0"/>
               <a:t>créer</a:t>
             </a:r>
-            <a:endParaRPr lang="fr-FR" dirty="0"/>
           </a:p>
         </p:txBody>
       </p:sp>
@@ -25356,24 +25957,23 @@
           <a:p>
             <a:pPr algn="ctr"/>
             <a:r>
-              <a:rPr lang="fr-FR" dirty="0" smtClean="0"/>
+              <a:rPr lang="fr-FR" dirty="0"/>
               <a:t>Quelques IA</a:t>
             </a:r>
             <a:br>
-              <a:rPr lang="fr-FR" dirty="0" smtClean="0"/>
+              <a:rPr lang="fr-FR" dirty="0"/>
             </a:br>
             <a:r>
-              <a:rPr lang="fr-FR" dirty="0" smtClean="0"/>
+              <a:rPr lang="fr-FR" dirty="0"/>
               <a:t>d’entrainement</a:t>
             </a:r>
             <a:br>
-              <a:rPr lang="fr-FR" dirty="0" smtClean="0"/>
+              <a:rPr lang="fr-FR" dirty="0"/>
             </a:br>
             <a:r>
-              <a:rPr lang="fr-FR" dirty="0" smtClean="0"/>
+              <a:rPr lang="fr-FR" dirty="0"/>
               <a:t>disponibles</a:t>
             </a:r>
-            <a:endParaRPr lang="fr-FR" dirty="0"/>
           </a:p>
         </p:txBody>
       </p:sp>
@@ -25419,24 +26019,23 @@
           <a:p>
             <a:pPr algn="ctr"/>
             <a:r>
-              <a:rPr lang="fr-FR" dirty="0" smtClean="0"/>
+              <a:rPr lang="fr-FR" dirty="0"/>
               <a:t>Quelques IA</a:t>
             </a:r>
             <a:br>
-              <a:rPr lang="fr-FR" dirty="0" smtClean="0"/>
+              <a:rPr lang="fr-FR" dirty="0"/>
             </a:br>
             <a:r>
-              <a:rPr lang="fr-FR" dirty="0" smtClean="0"/>
+              <a:rPr lang="fr-FR" dirty="0"/>
               <a:t>d’entrainement</a:t>
             </a:r>
             <a:br>
-              <a:rPr lang="fr-FR" dirty="0" smtClean="0"/>
+              <a:rPr lang="fr-FR" dirty="0"/>
             </a:br>
             <a:r>
-              <a:rPr lang="fr-FR" dirty="0" smtClean="0"/>
+              <a:rPr lang="fr-FR" dirty="0"/>
               <a:t>disponibles</a:t>
             </a:r>
-            <a:endParaRPr lang="fr-FR" dirty="0"/>
           </a:p>
         </p:txBody>
       </p:sp>
@@ -25482,24 +26081,23 @@
           <a:p>
             <a:pPr algn="ctr"/>
             <a:r>
-              <a:rPr lang="fr-FR" dirty="0" smtClean="0"/>
+              <a:rPr lang="fr-FR" dirty="0"/>
               <a:t>Quelques IA</a:t>
             </a:r>
             <a:br>
-              <a:rPr lang="fr-FR" dirty="0" smtClean="0"/>
+              <a:rPr lang="fr-FR" dirty="0"/>
             </a:br>
             <a:r>
-              <a:rPr lang="fr-FR" dirty="0" smtClean="0"/>
+              <a:rPr lang="fr-FR" dirty="0"/>
               <a:t>d’entrainement</a:t>
             </a:r>
             <a:br>
-              <a:rPr lang="fr-FR" dirty="0" smtClean="0"/>
+              <a:rPr lang="fr-FR" dirty="0"/>
             </a:br>
             <a:r>
-              <a:rPr lang="fr-FR" dirty="0" smtClean="0"/>
+              <a:rPr lang="fr-FR" dirty="0"/>
               <a:t>disponibles</a:t>
             </a:r>
-            <a:endParaRPr lang="fr-FR" dirty="0"/>
           </a:p>
         </p:txBody>
       </p:sp>
@@ -25538,17 +26136,16 @@
           <a:p>
             <a:pPr algn="ctr"/>
             <a:r>
-              <a:rPr lang="fr-FR" dirty="0" smtClean="0"/>
+              <a:rPr lang="fr-FR" dirty="0"/>
               <a:t>Client pour afficher</a:t>
             </a:r>
             <a:br>
-              <a:rPr lang="fr-FR" dirty="0" smtClean="0"/>
+              <a:rPr lang="fr-FR" dirty="0"/>
             </a:br>
             <a:r>
-              <a:rPr lang="fr-FR" dirty="0" smtClean="0"/>
+              <a:rPr lang="fr-FR" dirty="0"/>
               <a:t>les infos de l’IA</a:t>
             </a:r>
-            <a:endParaRPr lang="fr-FR" dirty="0"/>
           </a:p>
         </p:txBody>
       </p:sp>
@@ -25860,10 +26457,9 @@
           <a:lstStyle/>
           <a:p>
             <a:r>
-              <a:rPr lang="fr-FR" dirty="0" smtClean="0"/>
+              <a:rPr lang="fr-FR" dirty="0"/>
               <a:t>Architecture</a:t>
             </a:r>
-            <a:endParaRPr lang="fr-FR" dirty="0"/>
           </a:p>
         </p:txBody>
       </p:sp>
@@ -25880,7 +26476,7 @@
 </p:sld>
 </file>
 
-<file path=ppt/slides/slide7.xml><?xml version="1.0" encoding="utf-8"?>
+<file path=ppt/slides/slide9.xml><?xml version="1.0" encoding="utf-8"?>
 <p:sld xmlns:a="http://schemas.openxmlformats.org/drawingml/2006/main" xmlns:r="http://schemas.openxmlformats.org/officeDocument/2006/relationships" xmlns:p="http://schemas.openxmlformats.org/presentationml/2006/main">
   <p:cSld>
     <p:spTree>
@@ -25913,10 +26509,9 @@
           <a:lstStyle/>
           <a:p>
             <a:r>
-              <a:rPr lang="fr-FR" dirty="0" smtClean="0"/>
+              <a:rPr lang="fr-FR" dirty="0"/>
               <a:t>Résonateur</a:t>
             </a:r>
-            <a:endParaRPr lang="fr-FR" dirty="0"/>
           </a:p>
         </p:txBody>
       </p:sp>
@@ -25936,55 +26531,54 @@
           <a:lstStyle/>
           <a:p>
             <a:r>
-              <a:rPr lang="fr-FR" dirty="0" smtClean="0"/>
+              <a:rPr lang="fr-FR" dirty="0"/>
               <a:t>Ils sont disséminés sur le terrain de jeu</a:t>
             </a:r>
           </a:p>
           <a:p>
             <a:r>
-              <a:rPr lang="fr-FR" dirty="0" smtClean="0"/>
+              <a:rPr lang="fr-FR" dirty="0"/>
               <a:t>Un résonateur peut être :</a:t>
             </a:r>
           </a:p>
           <a:p>
             <a:pPr lvl="1"/>
             <a:r>
-              <a:rPr lang="fr-FR" dirty="0" smtClean="0"/>
+              <a:rPr lang="fr-FR" dirty="0"/>
               <a:t>Neutre</a:t>
             </a:r>
           </a:p>
           <a:p>
             <a:pPr lvl="1"/>
             <a:r>
-              <a:rPr lang="fr-FR" dirty="0" smtClean="0"/>
-              <a:t>Nous appartenir</a:t>
+              <a:rPr lang="fr-FR" dirty="0"/>
+              <a:t>Vous appartenir</a:t>
             </a:r>
           </a:p>
           <a:p>
             <a:pPr lvl="1"/>
             <a:r>
-              <a:rPr lang="fr-FR" dirty="0" smtClean="0"/>
+              <a:rPr lang="fr-FR" dirty="0"/>
               <a:t>Appartenir à un adversaire</a:t>
             </a:r>
           </a:p>
           <a:p>
             <a:r>
-              <a:rPr lang="fr-FR" dirty="0" smtClean="0"/>
+              <a:rPr lang="fr-FR" dirty="0"/>
               <a:t>L’objectif est d’en avoir un maximum</a:t>
             </a:r>
           </a:p>
           <a:p>
             <a:r>
-              <a:rPr lang="fr-FR" dirty="0" smtClean="0"/>
+              <a:rPr lang="fr-FR" dirty="0"/>
               <a:t>Prendre possession d’un résonateur neutre coûte 1 unité d’énergie</a:t>
             </a:r>
           </a:p>
           <a:p>
             <a:r>
-              <a:rPr lang="fr-FR" dirty="0" smtClean="0"/>
+              <a:rPr lang="fr-FR" dirty="0"/>
               <a:t>Convertir un résonateur adverse coûte 2 unités d’énergie</a:t>
             </a:r>
-            <a:endParaRPr lang="fr-FR" dirty="0"/>
           </a:p>
         </p:txBody>
       </p:sp>
@@ -26033,244 +26627,6 @@
     <p:extLst>
       <p:ext uri="{BB962C8B-B14F-4D97-AF65-F5344CB8AC3E}">
         <p14:creationId xmlns:p14="http://schemas.microsoft.com/office/powerpoint/2010/main" val="2475808560"/>
-      </p:ext>
-    </p:extLst>
-  </p:cSld>
-  <p:clrMapOvr>
-    <a:masterClrMapping/>
-  </p:clrMapOvr>
-</p:sld>
-</file>
-
-<file path=ppt/slides/slide8.xml><?xml version="1.0" encoding="utf-8"?>
-<p:sld xmlns:a="http://schemas.openxmlformats.org/drawingml/2006/main" xmlns:r="http://schemas.openxmlformats.org/officeDocument/2006/relationships" xmlns:p="http://schemas.openxmlformats.org/presentationml/2006/main">
-  <p:cSld>
-    <p:spTree>
-      <p:nvGrpSpPr>
-        <p:cNvPr id="1" name=""/>
-        <p:cNvGrpSpPr/>
-        <p:nvPr/>
-      </p:nvGrpSpPr>
-      <p:grpSpPr>
-        <a:xfrm>
-          <a:off x="0" y="0"/>
-          <a:ext cx="0" cy="0"/>
-          <a:chOff x="0" y="0"/>
-          <a:chExt cx="0" cy="0"/>
-        </a:xfrm>
-      </p:grpSpPr>
-      <p:sp>
-        <p:nvSpPr>
-          <p:cNvPr id="2" name="Titre 1"/>
-          <p:cNvSpPr>
-            <a:spLocks noGrp="1"/>
-          </p:cNvSpPr>
-          <p:nvPr>
-            <p:ph type="title"/>
-          </p:nvPr>
-        </p:nvSpPr>
-        <p:spPr/>
-        <p:txBody>
-          <a:bodyPr/>
-          <a:lstStyle/>
-          <a:p>
-            <a:r>
-              <a:rPr lang="fr-FR" dirty="0" smtClean="0"/>
-              <a:t>Vie</a:t>
-            </a:r>
-            <a:endParaRPr lang="fr-FR" dirty="0"/>
-          </a:p>
-        </p:txBody>
-      </p:sp>
-      <p:sp>
-        <p:nvSpPr>
-          <p:cNvPr id="3" name="Espace réservé du contenu 2"/>
-          <p:cNvSpPr>
-            <a:spLocks noGrp="1"/>
-          </p:cNvSpPr>
-          <p:nvPr>
-            <p:ph idx="1"/>
-          </p:nvPr>
-        </p:nvSpPr>
-        <p:spPr/>
-        <p:txBody>
-          <a:bodyPr/>
-          <a:lstStyle/>
-          <a:p>
-            <a:r>
-              <a:rPr lang="fr-FR" dirty="0" smtClean="0"/>
-              <a:t>Un protagoniste n’a qu’un seule vie</a:t>
-            </a:r>
-          </a:p>
-          <a:p>
-            <a:r>
-              <a:rPr lang="fr-FR" dirty="0" smtClean="0"/>
-              <a:t>On perd sa vie :</a:t>
-            </a:r>
-          </a:p>
-          <a:p>
-            <a:pPr lvl="1"/>
-            <a:r>
-              <a:rPr lang="fr-FR" dirty="0" smtClean="0"/>
-              <a:t>Lorsque le niveau d’énergie tombe à zéro</a:t>
-            </a:r>
-          </a:p>
-          <a:p>
-            <a:pPr lvl="1"/>
-            <a:r>
-              <a:rPr lang="fr-FR" dirty="0" smtClean="0"/>
-              <a:t>Lorsque l’on se prend un coup directement alors que le bouclier protecteur est désactivé</a:t>
-            </a:r>
-            <a:endParaRPr lang="fr-FR" dirty="0"/>
-          </a:p>
-        </p:txBody>
-      </p:sp>
-    </p:spTree>
-    <p:extLst>
-      <p:ext uri="{BB962C8B-B14F-4D97-AF65-F5344CB8AC3E}">
-        <p14:creationId xmlns:p14="http://schemas.microsoft.com/office/powerpoint/2010/main" val="1341023225"/>
-      </p:ext>
-    </p:extLst>
-  </p:cSld>
-  <p:clrMapOvr>
-    <a:masterClrMapping/>
-  </p:clrMapOvr>
-</p:sld>
-</file>
-
-<file path=ppt/slides/slide9.xml><?xml version="1.0" encoding="utf-8"?>
-<p:sld xmlns:a="http://schemas.openxmlformats.org/drawingml/2006/main" xmlns:r="http://schemas.openxmlformats.org/officeDocument/2006/relationships" xmlns:p="http://schemas.openxmlformats.org/presentationml/2006/main">
-  <p:cSld>
-    <p:spTree>
-      <p:nvGrpSpPr>
-        <p:cNvPr id="1" name=""/>
-        <p:cNvGrpSpPr/>
-        <p:nvPr/>
-      </p:nvGrpSpPr>
-      <p:grpSpPr>
-        <a:xfrm>
-          <a:off x="0" y="0"/>
-          <a:ext cx="0" cy="0"/>
-          <a:chOff x="0" y="0"/>
-          <a:chExt cx="0" cy="0"/>
-        </a:xfrm>
-      </p:grpSpPr>
-      <p:sp>
-        <p:nvSpPr>
-          <p:cNvPr id="2" name="Titre 1"/>
-          <p:cNvSpPr>
-            <a:spLocks noGrp="1"/>
-          </p:cNvSpPr>
-          <p:nvPr>
-            <p:ph type="title"/>
-          </p:nvPr>
-        </p:nvSpPr>
-        <p:spPr/>
-        <p:txBody>
-          <a:bodyPr/>
-          <a:lstStyle/>
-          <a:p>
-            <a:r>
-              <a:rPr lang="fr-FR" dirty="0" smtClean="0"/>
-              <a:t>Energie</a:t>
-            </a:r>
-            <a:endParaRPr lang="fr-FR" dirty="0"/>
-          </a:p>
-        </p:txBody>
-      </p:sp>
-      <p:sp>
-        <p:nvSpPr>
-          <p:cNvPr id="3" name="Espace réservé du contenu 2"/>
-          <p:cNvSpPr>
-            <a:spLocks noGrp="1"/>
-          </p:cNvSpPr>
-          <p:nvPr>
-            <p:ph idx="1"/>
-          </p:nvPr>
-        </p:nvSpPr>
-        <p:spPr/>
-        <p:txBody>
-          <a:bodyPr/>
-          <a:lstStyle/>
-          <a:p>
-            <a:r>
-              <a:rPr lang="fr-FR" dirty="0" smtClean="0"/>
-              <a:t>Chaque protagoniste démarre avec 100 unités d’énergie</a:t>
-            </a:r>
-          </a:p>
-          <a:p>
-            <a:r>
-              <a:rPr lang="fr-FR" dirty="0" smtClean="0"/>
-              <a:t>Un protagoniste a perdu si sa réserve d’énergie tombe à zéro</a:t>
-            </a:r>
-          </a:p>
-          <a:p>
-            <a:r>
-              <a:rPr lang="fr-FR" dirty="0" smtClean="0"/>
-              <a:t>Il n’y a pas de limite de stockage de l’énergie</a:t>
-            </a:r>
-          </a:p>
-          <a:p>
-            <a:r>
-              <a:rPr lang="fr-FR" dirty="0" smtClean="0"/>
-              <a:t>Il y a perte au minimum de 1 unité d’énergie à chaque tour, même sans aucune détection, ni action effectuée</a:t>
-            </a:r>
-          </a:p>
-          <a:p>
-            <a:r>
-              <a:rPr lang="fr-FR" dirty="0" smtClean="0"/>
-              <a:t>L’énergie est consommé par la détection</a:t>
-            </a:r>
-          </a:p>
-          <a:p>
-            <a:r>
-              <a:rPr lang="fr-FR" dirty="0" smtClean="0"/>
-              <a:t>L’énergie est consommé par les actions</a:t>
-            </a:r>
-          </a:p>
-          <a:p>
-            <a:r>
-              <a:rPr lang="fr-FR" dirty="0" smtClean="0"/>
-              <a:t>De l’énergie peut être récupérée sur le terrain</a:t>
-            </a:r>
-            <a:endParaRPr lang="fr-FR" dirty="0"/>
-          </a:p>
-        </p:txBody>
-      </p:sp>
-      <p:pic>
-        <p:nvPicPr>
-          <p:cNvPr id="5" name="Image 4"/>
-          <p:cNvPicPr>
-            <a:picLocks noChangeAspect="1"/>
-          </p:cNvPicPr>
-          <p:nvPr/>
-        </p:nvPicPr>
-        <p:blipFill>
-          <a:blip r:embed="rId2" cstate="print">
-            <a:extLst>
-              <a:ext uri="{28A0092B-C50C-407E-A947-70E740481C1C}">
-                <a14:useLocalDpi xmlns:a14="http://schemas.microsoft.com/office/drawing/2010/main" val="0"/>
-              </a:ext>
-            </a:extLst>
-          </a:blip>
-          <a:stretch>
-            <a:fillRect/>
-          </a:stretch>
-        </p:blipFill>
-        <p:spPr>
-          <a:xfrm>
-            <a:off x="7910119" y="846896"/>
-            <a:ext cx="1439411" cy="1439411"/>
-          </a:xfrm>
-          <a:prstGeom prst="rect">
-            <a:avLst/>
-          </a:prstGeom>
-        </p:spPr>
-      </p:pic>
-    </p:spTree>
-    <p:extLst>
-      <p:ext uri="{BB962C8B-B14F-4D97-AF65-F5344CB8AC3E}">
-        <p14:creationId xmlns:p14="http://schemas.microsoft.com/office/powerpoint/2010/main" val="2285094419"/>
       </p:ext>
     </p:extLst>
   </p:cSld>

</xml_diff>